<commit_message>
Commit for lesson 1
Update source code mau, xoa file khong can thiet cho bai 1
</commit_message>
<xml_diff>
--- a/Bai 1/Bài 1 - Tổng quan về hdh Unix.pptx
+++ b/Bai 1/Bài 1 - Tổng quan về hdh Unix.pptx
@@ -5,25 +5,24 @@
     <p:sldMasterId id="2147483648" r:id="rId1"/>
   </p:sldMasterIdLst>
   <p:notesMasterIdLst>
-    <p:notesMasterId r:id="rId15"/>
+    <p:notesMasterId r:id="rId14"/>
   </p:notesMasterIdLst>
   <p:handoutMasterIdLst>
-    <p:handoutMasterId r:id="rId16"/>
+    <p:handoutMasterId r:id="rId15"/>
   </p:handoutMasterIdLst>
   <p:sldIdLst>
     <p:sldId id="256" r:id="rId2"/>
     <p:sldId id="274" r:id="rId3"/>
-    <p:sldId id="273" r:id="rId4"/>
-    <p:sldId id="263" r:id="rId5"/>
-    <p:sldId id="264" r:id="rId6"/>
-    <p:sldId id="265" r:id="rId7"/>
-    <p:sldId id="266" r:id="rId8"/>
-    <p:sldId id="267" r:id="rId9"/>
-    <p:sldId id="268" r:id="rId10"/>
-    <p:sldId id="269" r:id="rId11"/>
-    <p:sldId id="270" r:id="rId12"/>
-    <p:sldId id="271" r:id="rId13"/>
-    <p:sldId id="258" r:id="rId14"/>
+    <p:sldId id="263" r:id="rId4"/>
+    <p:sldId id="264" r:id="rId5"/>
+    <p:sldId id="265" r:id="rId6"/>
+    <p:sldId id="266" r:id="rId7"/>
+    <p:sldId id="267" r:id="rId8"/>
+    <p:sldId id="268" r:id="rId9"/>
+    <p:sldId id="269" r:id="rId10"/>
+    <p:sldId id="270" r:id="rId11"/>
+    <p:sldId id="271" r:id="rId12"/>
+    <p:sldId id="258" r:id="rId13"/>
   </p:sldIdLst>
   <p:sldSz cx="9144000" cy="5143500" type="screen16x9"/>
   <p:notesSz cx="6858000" cy="9144000"/>
@@ -223,7 +222,7 @@
           <a:p>
             <a:fld id="{9DF6B2F8-E390-BD4F-9ACD-789C35D23CE3}" type="datetimeFigureOut">
               <a:rPr lang="en-US" smtClean="0"/>
-              <a:t>11/9/2018</a:t>
+              <a:t>4/2/2019</a:t>
             </a:fld>
             <a:endParaRPr lang="en-US"/>
           </a:p>
@@ -389,7 +388,7 @@
           <a:p>
             <a:fld id="{79FF8F81-D7B9-424E-B993-6D09B3871A4E}" type="datetimeFigureOut">
               <a:rPr lang="en-US" smtClean="0"/>
-              <a:t>11/9/2018</a:t>
+              <a:t>4/2/2019</a:t>
             </a:fld>
             <a:endParaRPr lang="en-US"/>
           </a:p>
@@ -723,7 +722,7 @@
           <a:p>
             <a:fld id="{2B3067B3-3AE6-DD4A-9E3D-C999AB3971A1}" type="slidenum">
               <a:rPr lang="en-US" smtClean="0"/>
-              <a:t>13</a:t>
+              <a:t>12</a:t>
             </a:fld>
             <a:endParaRPr lang="en-US"/>
           </a:p>
@@ -963,7 +962,7 @@
           <a:p>
             <a:fld id="{7F3FBE28-58BC-4486-9A8E-6C1F0E326EAB}" type="datetime1">
               <a:rPr lang="en-US" smtClean="0"/>
-              <a:t>11/9/2018</a:t>
+              <a:t>4/2/2019</a:t>
             </a:fld>
             <a:endParaRPr lang="en-US"/>
           </a:p>
@@ -1149,7 +1148,7 @@
           <a:p>
             <a:fld id="{AE5B28C3-1882-4E84-9C82-23BA74B52008}" type="datetime1">
               <a:rPr lang="en-US" smtClean="0"/>
-              <a:t>11/9/2018</a:t>
+              <a:t>4/2/2019</a:t>
             </a:fld>
             <a:endParaRPr lang="en-US"/>
           </a:p>
@@ -1333,7 +1332,7 @@
           <a:p>
             <a:fld id="{945B1917-4DD8-41D3-93A0-974B9DFBBCBF}" type="datetime1">
               <a:rPr lang="en-US" smtClean="0"/>
-              <a:t>11/9/2018</a:t>
+              <a:t>4/2/2019</a:t>
             </a:fld>
             <a:endParaRPr lang="en-US"/>
           </a:p>
@@ -1552,7 +1551,7 @@
           <a:p>
             <a:fld id="{403BB6E5-7AA4-4C0D-BF97-BDC69083DBC9}" type="datetime1">
               <a:rPr lang="en-US" smtClean="0"/>
-              <a:t>11/9/2018</a:t>
+              <a:t>4/2/2019</a:t>
             </a:fld>
             <a:endParaRPr lang="en-US"/>
           </a:p>
@@ -1809,7 +1808,7 @@
           <a:p>
             <a:fld id="{5E5BBB4B-2F94-4F11-9AD4-28D0EBD25231}" type="datetime1">
               <a:rPr lang="en-US" smtClean="0"/>
-              <a:t>11/9/2018</a:t>
+              <a:t>4/2/2019</a:t>
             </a:fld>
             <a:endParaRPr lang="en-US"/>
           </a:p>
@@ -2108,7 +2107,7 @@
           <a:p>
             <a:fld id="{B79A5478-161F-4B28-93E5-DE9BF6B2D5E2}" type="datetime1">
               <a:rPr lang="en-US" smtClean="0"/>
-              <a:t>11/9/2018</a:t>
+              <a:t>4/2/2019</a:t>
             </a:fld>
             <a:endParaRPr lang="en-US"/>
           </a:p>
@@ -2546,7 +2545,7 @@
           <a:p>
             <a:fld id="{30E38055-F1C9-4AC4-B9E3-476EF82AD4CC}" type="datetime1">
               <a:rPr lang="en-US" smtClean="0"/>
-              <a:t>11/9/2018</a:t>
+              <a:t>4/2/2019</a:t>
             </a:fld>
             <a:endParaRPr lang="en-US"/>
           </a:p>
@@ -2675,7 +2674,7 @@
           <a:p>
             <a:fld id="{39D9E8B6-A1D4-4191-8D54-A8260B6A1972}" type="datetime1">
               <a:rPr lang="en-US" smtClean="0"/>
-              <a:t>11/9/2018</a:t>
+              <a:t>4/2/2019</a:t>
             </a:fld>
             <a:endParaRPr lang="en-US"/>
           </a:p>
@@ -2781,7 +2780,7 @@
           <a:p>
             <a:fld id="{924C1980-AF69-46D2-A9FE-14E6E6C939BE}" type="datetime1">
               <a:rPr lang="en-US" smtClean="0"/>
-              <a:t>11/9/2018</a:t>
+              <a:t>4/2/2019</a:t>
             </a:fld>
             <a:endParaRPr lang="en-US"/>
           </a:p>
@@ -3052,7 +3051,7 @@
           <a:p>
             <a:fld id="{AAA33C03-0194-466F-B287-AA772F5566B9}" type="datetime1">
               <a:rPr lang="en-US" smtClean="0"/>
-              <a:t>11/9/2018</a:t>
+              <a:t>4/2/2019</a:t>
             </a:fld>
             <a:endParaRPr lang="en-US"/>
           </a:p>
@@ -3348,7 +3347,7 @@
           <a:p>
             <a:fld id="{D31FF56F-D32E-44F3-A5D6-9F4533FAF9BD}" type="datetime1">
               <a:rPr lang="en-US" smtClean="0"/>
-              <a:t>11/9/2018</a:t>
+              <a:t>4/2/2019</a:t>
             </a:fld>
             <a:endParaRPr lang="en-US"/>
           </a:p>
@@ -3595,7 +3594,7 @@
           <a:p>
             <a:fld id="{0289C729-EC9D-4075-8A00-DCB3B3221814}" type="datetime1">
               <a:rPr lang="en-US" smtClean="0"/>
-              <a:t>11/9/2018</a:t>
+              <a:t>4/2/2019</a:t>
             </a:fld>
             <a:endParaRPr lang="en-US"/>
           </a:p>
@@ -4171,12 +4170,12 @@
       </p:grpSpPr>
       <p:sp>
         <p:nvSpPr>
-          <p:cNvPr id="2" name="Title 1"/>
-          <p:cNvSpPr>
-            <a:spLocks noGrp="1"/>
-          </p:cNvSpPr>
-          <p:nvPr>
-            <p:ph type="title"/>
+          <p:cNvPr id="4" name="Content Placeholder 3"/>
+          <p:cNvSpPr>
+            <a:spLocks noGrp="1"/>
+          </p:cNvSpPr>
+          <p:nvPr>
+            <p:ph idx="1"/>
           </p:nvPr>
         </p:nvSpPr>
         <p:spPr/>
@@ -4185,116 +4184,196 @@
           <a:lstStyle/>
           <a:p>
             <a:r>
-              <a:rPr lang="fr-FR" dirty="0" err="1" smtClean="0"/>
-              <a:t>Hệ</a:t>
-            </a:r>
-            <a:r>
-              <a:rPr lang="fr-FR" dirty="0" smtClean="0"/>
-              <a:t> </a:t>
-            </a:r>
-            <a:r>
-              <a:rPr lang="fr-FR" dirty="0" err="1" smtClean="0"/>
-              <a:t>điều</a:t>
-            </a:r>
-            <a:r>
-              <a:rPr lang="fr-FR" dirty="0" smtClean="0"/>
-              <a:t> </a:t>
-            </a:r>
-            <a:r>
-              <a:rPr lang="fr-FR" dirty="0" err="1" smtClean="0"/>
-              <a:t>hành</a:t>
-            </a:r>
-            <a:r>
-              <a:rPr lang="fr-FR" dirty="0" smtClean="0"/>
-              <a:t> </a:t>
-            </a:r>
-            <a:r>
-              <a:rPr lang="fr-FR" dirty="0" err="1" smtClean="0"/>
-              <a:t>đa</a:t>
-            </a:r>
-            <a:r>
-              <a:rPr lang="fr-FR" dirty="0" smtClean="0"/>
-              <a:t> </a:t>
-            </a:r>
-            <a:r>
-              <a:rPr lang="fr-FR" dirty="0" err="1" smtClean="0"/>
-              <a:t>nhiệm</a:t>
-            </a:r>
-            <a:endParaRPr lang="fr-FR" dirty="0"/>
-          </a:p>
-        </p:txBody>
-      </p:sp>
-      <p:sp>
-        <p:nvSpPr>
-          <p:cNvPr id="3" name="Text Placeholder 2"/>
-          <p:cNvSpPr>
-            <a:spLocks noGrp="1"/>
-          </p:cNvSpPr>
-          <p:nvPr>
-            <p:ph idx="1"/>
-          </p:nvPr>
-        </p:nvSpPr>
-        <p:spPr/>
+              <a:rPr lang="en-US" dirty="0" err="1" smtClean="0"/>
+              <a:t>Bắt</a:t>
+            </a:r>
+            <a:r>
+              <a:rPr lang="en-US" dirty="0" smtClean="0"/>
+              <a:t> </a:t>
+            </a:r>
+            <a:r>
+              <a:rPr lang="en-US" dirty="0" err="1" smtClean="0"/>
+              <a:t>đầu</a:t>
+            </a:r>
+            <a:r>
+              <a:rPr lang="en-US" dirty="0" smtClean="0"/>
+              <a:t> với thư </a:t>
+            </a:r>
+            <a:r>
+              <a:rPr lang="en-US" dirty="0" err="1" smtClean="0"/>
+              <a:t>mục</a:t>
+            </a:r>
+            <a:r>
+              <a:rPr lang="en-US" dirty="0" smtClean="0"/>
+              <a:t> root (</a:t>
+            </a:r>
+            <a:r>
+              <a:rPr lang="en-US" dirty="0" err="1" smtClean="0"/>
+              <a:t>giống</a:t>
+            </a:r>
+            <a:r>
+              <a:rPr lang="en-US" dirty="0" smtClean="0"/>
+              <a:t> với </a:t>
+            </a:r>
+            <a:r>
+              <a:rPr lang="en-US" dirty="0" err="1" smtClean="0"/>
+              <a:t>mycomputer</a:t>
+            </a:r>
+            <a:r>
+              <a:rPr lang="en-US" dirty="0" smtClean="0"/>
+              <a:t> trên Window). Từ root sẽ </a:t>
+            </a:r>
+            <a:r>
+              <a:rPr lang="en-US" dirty="0" err="1" smtClean="0"/>
+              <a:t>rẽ</a:t>
+            </a:r>
+            <a:r>
+              <a:rPr lang="en-US" dirty="0" smtClean="0"/>
+              <a:t> </a:t>
+            </a:r>
+            <a:r>
+              <a:rPr lang="en-US" dirty="0" err="1" smtClean="0"/>
+              <a:t>nhánh</a:t>
+            </a:r>
+            <a:r>
+              <a:rPr lang="en-US" dirty="0" smtClean="0"/>
+              <a:t> sang các folder </a:t>
+            </a:r>
+            <a:r>
+              <a:rPr lang="en-US" dirty="0" err="1" smtClean="0"/>
+              <a:t>khác</a:t>
+            </a:r>
+            <a:r>
+              <a:rPr lang="en-US" dirty="0" smtClean="0"/>
+              <a:t>. </a:t>
+            </a:r>
+            <a:r>
+              <a:rPr lang="en-US" dirty="0" err="1" smtClean="0"/>
+              <a:t>Mỗi</a:t>
+            </a:r>
+            <a:r>
+              <a:rPr lang="en-US" dirty="0" smtClean="0"/>
+              <a:t> folder dùng </a:t>
+            </a:r>
+            <a:r>
+              <a:rPr lang="en-US" dirty="0" err="1" smtClean="0"/>
+              <a:t>để</a:t>
+            </a:r>
+            <a:r>
+              <a:rPr lang="en-US" dirty="0" smtClean="0"/>
+              <a:t> </a:t>
+            </a:r>
+            <a:r>
+              <a:rPr lang="en-US" dirty="0" err="1" smtClean="0"/>
+              <a:t>chứa</a:t>
+            </a:r>
+            <a:r>
+              <a:rPr lang="en-US" dirty="0"/>
+              <a:t> </a:t>
+            </a:r>
+            <a:r>
+              <a:rPr lang="en-US" dirty="0" smtClean="0"/>
+              <a:t>các file với các </a:t>
+            </a:r>
+            <a:r>
+              <a:rPr lang="en-US" dirty="0" err="1" smtClean="0"/>
+              <a:t>mục</a:t>
+            </a:r>
+            <a:r>
+              <a:rPr lang="en-US" dirty="0" smtClean="0"/>
+              <a:t> </a:t>
+            </a:r>
+            <a:r>
+              <a:rPr lang="en-US" dirty="0" err="1" smtClean="0"/>
+              <a:t>đích</a:t>
+            </a:r>
+            <a:r>
+              <a:rPr lang="en-US" dirty="0" smtClean="0"/>
+              <a:t> </a:t>
+            </a:r>
+            <a:r>
+              <a:rPr lang="en-US" dirty="0" err="1" smtClean="0"/>
+              <a:t>khác</a:t>
+            </a:r>
+            <a:r>
+              <a:rPr lang="en-US" dirty="0" smtClean="0"/>
+              <a:t> </a:t>
+            </a:r>
+            <a:r>
+              <a:rPr lang="en-US" dirty="0" err="1" smtClean="0"/>
+              <a:t>nhau</a:t>
+            </a:r>
+            <a:r>
+              <a:rPr lang="en-US" dirty="0" smtClean="0"/>
+              <a:t>.</a:t>
+            </a:r>
+            <a:endParaRPr lang="en-US" dirty="0"/>
+          </a:p>
+        </p:txBody>
+      </p:sp>
+      <p:pic>
+        <p:nvPicPr>
+          <p:cNvPr id="6" name="Picture 5"/>
+          <p:cNvPicPr>
+            <a:picLocks noChangeAspect="1"/>
+          </p:cNvPicPr>
+          <p:nvPr/>
+        </p:nvPicPr>
+        <p:blipFill>
+          <a:blip r:embed="rId2"/>
+          <a:stretch>
+            <a:fillRect/>
+          </a:stretch>
+        </p:blipFill>
+        <p:spPr>
+          <a:xfrm>
+            <a:off x="397563" y="2244924"/>
+            <a:ext cx="3067949" cy="1181100"/>
+          </a:xfrm>
+          <a:prstGeom prst="rect">
+            <a:avLst/>
+          </a:prstGeom>
+        </p:spPr>
+      </p:pic>
+      <p:sp>
+        <p:nvSpPr>
+          <p:cNvPr id="5" name="Text Placeholder 4"/>
+          <p:cNvSpPr>
+            <a:spLocks noGrp="1"/>
+          </p:cNvSpPr>
+          <p:nvPr>
+            <p:ph type="body" sz="half" idx="2"/>
+          </p:nvPr>
+        </p:nvSpPr>
+        <p:spPr>
+          <a:xfrm>
+            <a:off x="427382" y="2257425"/>
+            <a:ext cx="3008313" cy="1181099"/>
+          </a:xfrm>
+        </p:spPr>
         <p:txBody>
           <a:bodyPr/>
           <a:lstStyle/>
           <a:p>
-            <a:pPr lvl="0"/>
-            <a:r>
-              <a:rPr lang="en-US" dirty="0" smtClean="0"/>
-              <a:t>Idea: </a:t>
-            </a:r>
-            <a:r>
-              <a:rPr lang="en-US" dirty="0" err="1" smtClean="0"/>
-              <a:t>Bộ</a:t>
-            </a:r>
-            <a:r>
-              <a:rPr lang="en-US" dirty="0" smtClean="0"/>
-              <a:t> </a:t>
-            </a:r>
-            <a:r>
-              <a:rPr lang="en-US" dirty="0" err="1" smtClean="0"/>
-              <a:t>não</a:t>
-            </a:r>
-            <a:r>
-              <a:rPr lang="en-US" dirty="0" smtClean="0"/>
-              <a:t> của con người </a:t>
-            </a:r>
-            <a:r>
-              <a:rPr lang="en-US" dirty="0" err="1" smtClean="0"/>
-              <a:t>luôn</a:t>
-            </a:r>
-            <a:r>
-              <a:rPr lang="en-US" dirty="0" smtClean="0"/>
-              <a:t> </a:t>
-            </a:r>
-            <a:r>
-              <a:rPr lang="en-US" dirty="0" err="1" smtClean="0"/>
-              <a:t>chậm</a:t>
-            </a:r>
-            <a:r>
-              <a:rPr lang="en-US" dirty="0" smtClean="0"/>
-              <a:t> hơn </a:t>
-            </a:r>
-            <a:r>
-              <a:rPr lang="en-US" dirty="0" err="1" smtClean="0"/>
-              <a:t>máy</a:t>
-            </a:r>
-            <a:r>
-              <a:rPr lang="en-US" dirty="0" smtClean="0"/>
-              <a:t> </a:t>
-            </a:r>
-            <a:r>
-              <a:rPr lang="en-US" dirty="0" err="1" smtClean="0"/>
-              <a:t>tính</a:t>
-            </a:r>
-            <a:r>
-              <a:rPr lang="en-US" dirty="0" smtClean="0"/>
-              <a:t>.</a:t>
-            </a:r>
-          </a:p>
-          <a:p>
-            <a:pPr lvl="0"/>
+            <a:endParaRPr lang="en-US" dirty="0"/>
+          </a:p>
+        </p:txBody>
+      </p:sp>
+      <p:sp>
+        <p:nvSpPr>
+          <p:cNvPr id="2" name="Title 1"/>
+          <p:cNvSpPr>
+            <a:spLocks noGrp="1"/>
+          </p:cNvSpPr>
+          <p:nvPr>
+            <p:ph type="title"/>
+          </p:nvPr>
+        </p:nvSpPr>
+        <p:spPr/>
+        <p:txBody>
+          <a:bodyPr/>
+          <a:lstStyle/>
+          <a:p>
             <a:r>
               <a:rPr lang="en-US" dirty="0" err="1" smtClean="0"/>
               <a:t>Hệ</a:t>
@@ -4305,250 +4384,11 @@
             </a:r>
             <a:r>
               <a:rPr lang="en-US" dirty="0" err="1" smtClean="0"/>
-              <a:t>điều</a:t>
-            </a:r>
-            <a:r>
-              <a:rPr lang="en-US" dirty="0" smtClean="0"/>
-              <a:t> </a:t>
-            </a:r>
-            <a:r>
-              <a:rPr lang="en-US" dirty="0" err="1" smtClean="0"/>
-              <a:t>hành</a:t>
-            </a:r>
-            <a:r>
-              <a:rPr lang="en-US" dirty="0" smtClean="0"/>
-              <a:t> </a:t>
-            </a:r>
-            <a:r>
-              <a:rPr lang="en-US" dirty="0" err="1" smtClean="0"/>
-              <a:t>đa</a:t>
-            </a:r>
-            <a:r>
-              <a:rPr lang="en-US" dirty="0" smtClean="0"/>
-              <a:t> </a:t>
-            </a:r>
-            <a:r>
-              <a:rPr lang="en-US" dirty="0" err="1" smtClean="0"/>
-              <a:t>nhiệm</a:t>
-            </a:r>
-            <a:r>
-              <a:rPr lang="en-US" dirty="0" smtClean="0"/>
-              <a:t>: Cho </a:t>
-            </a:r>
-            <a:r>
-              <a:rPr lang="en-US" dirty="0" err="1" smtClean="0"/>
-              <a:t>phép</a:t>
-            </a:r>
-            <a:r>
-              <a:rPr lang="en-US" dirty="0" smtClean="0"/>
-              <a:t> </a:t>
-            </a:r>
-            <a:r>
-              <a:rPr lang="en-US" dirty="0" err="1" smtClean="0"/>
-              <a:t>chuyển</a:t>
-            </a:r>
-            <a:r>
-              <a:rPr lang="en-US" dirty="0" smtClean="0"/>
-              <a:t> </a:t>
-            </a:r>
-            <a:r>
-              <a:rPr lang="en-US" dirty="0" err="1" smtClean="0"/>
-              <a:t>đổi</a:t>
-            </a:r>
-            <a:r>
-              <a:rPr lang="en-US" dirty="0" smtClean="0"/>
-              <a:t> </a:t>
-            </a:r>
-            <a:r>
-              <a:rPr lang="en-US" dirty="0" err="1" smtClean="0"/>
-              <a:t>giữa</a:t>
-            </a:r>
-            <a:r>
-              <a:rPr lang="en-US" dirty="0" smtClean="0"/>
-              <a:t> các task </a:t>
-            </a:r>
-            <a:r>
-              <a:rPr lang="en-US" dirty="0" err="1" smtClean="0"/>
-              <a:t>vụ</a:t>
-            </a:r>
-            <a:r>
-              <a:rPr lang="en-US" dirty="0" smtClean="0"/>
-              <a:t>, </a:t>
-            </a:r>
-            <a:r>
-              <a:rPr lang="en-US" dirty="0" err="1" smtClean="0"/>
-              <a:t>gây</a:t>
-            </a:r>
-            <a:r>
-              <a:rPr lang="en-US" dirty="0" smtClean="0"/>
-              <a:t> </a:t>
-            </a:r>
-            <a:r>
-              <a:rPr lang="en-US" dirty="0" err="1" smtClean="0"/>
-              <a:t>cảm</a:t>
-            </a:r>
-            <a:r>
-              <a:rPr lang="en-US" dirty="0" smtClean="0"/>
-              <a:t> </a:t>
-            </a:r>
-            <a:r>
-              <a:rPr lang="en-US" dirty="0" err="1" smtClean="0"/>
-              <a:t>giác</a:t>
-            </a:r>
-            <a:r>
-              <a:rPr lang="en-US" dirty="0" smtClean="0"/>
-              <a:t> </a:t>
-            </a:r>
-            <a:r>
-              <a:rPr lang="en-US" dirty="0" err="1" smtClean="0"/>
-              <a:t>hệ</a:t>
-            </a:r>
-            <a:r>
-              <a:rPr lang="en-US" dirty="0"/>
-              <a:t> </a:t>
-            </a:r>
-            <a:r>
-              <a:rPr lang="en-US" dirty="0" err="1" smtClean="0"/>
               <a:t>thống</a:t>
             </a:r>
             <a:r>
               <a:rPr lang="en-US" dirty="0" smtClean="0"/>
-              <a:t> có thể </a:t>
-            </a:r>
-            <a:r>
-              <a:rPr lang="en-US" dirty="0" err="1" smtClean="0"/>
-              <a:t>chạy</a:t>
-            </a:r>
-            <a:r>
-              <a:rPr lang="en-US" dirty="0" smtClean="0"/>
-              <a:t> song </a:t>
-            </a:r>
-            <a:r>
-              <a:rPr lang="en-US" dirty="0" err="1" smtClean="0"/>
-              <a:t>song</a:t>
-            </a:r>
-            <a:r>
-              <a:rPr lang="en-US" dirty="0" smtClean="0"/>
-              <a:t> </a:t>
-            </a:r>
-            <a:r>
-              <a:rPr lang="en-US" dirty="0" err="1" smtClean="0"/>
-              <a:t>rất</a:t>
-            </a:r>
-            <a:r>
-              <a:rPr lang="en-US" dirty="0" smtClean="0"/>
-              <a:t> </a:t>
-            </a:r>
-            <a:r>
-              <a:rPr lang="en-US" dirty="0" err="1" smtClean="0"/>
-              <a:t>nhiều</a:t>
-            </a:r>
-            <a:r>
-              <a:rPr lang="en-US" dirty="0" smtClean="0"/>
-              <a:t> </a:t>
-            </a:r>
-            <a:r>
-              <a:rPr lang="en-US" dirty="0" err="1" smtClean="0"/>
-              <a:t>tiến</a:t>
-            </a:r>
-            <a:r>
-              <a:rPr lang="en-US" dirty="0" smtClean="0"/>
-              <a:t> trình.</a:t>
-            </a:r>
-          </a:p>
-          <a:p>
-            <a:pPr lvl="0"/>
-            <a:r>
-              <a:rPr lang="en-US" dirty="0" err="1" smtClean="0"/>
-              <a:t>Câu</a:t>
-            </a:r>
-            <a:r>
-              <a:rPr lang="en-US" dirty="0" smtClean="0"/>
-              <a:t> hỏi </a:t>
-            </a:r>
-            <a:r>
-              <a:rPr lang="en-US" dirty="0" err="1" smtClean="0"/>
-              <a:t>pv</a:t>
-            </a:r>
-            <a:r>
-              <a:rPr lang="en-US" dirty="0" smtClean="0"/>
-              <a:t>: </a:t>
-            </a:r>
-            <a:r>
-              <a:rPr lang="en-US" dirty="0" err="1" smtClean="0"/>
-              <a:t>Hệ</a:t>
-            </a:r>
-            <a:r>
-              <a:rPr lang="en-US" dirty="0" smtClean="0"/>
-              <a:t> </a:t>
-            </a:r>
-            <a:r>
-              <a:rPr lang="en-US" dirty="0" err="1" smtClean="0"/>
-              <a:t>điều</a:t>
-            </a:r>
-            <a:r>
-              <a:rPr lang="en-US" dirty="0" smtClean="0"/>
-              <a:t> </a:t>
-            </a:r>
-            <a:r>
-              <a:rPr lang="en-US" dirty="0" err="1" smtClean="0"/>
-              <a:t>hành</a:t>
-            </a:r>
-            <a:r>
-              <a:rPr lang="en-US" dirty="0" smtClean="0"/>
-              <a:t> </a:t>
-            </a:r>
-            <a:r>
-              <a:rPr lang="en-US" dirty="0" err="1" smtClean="0"/>
-              <a:t>đa</a:t>
-            </a:r>
-            <a:r>
-              <a:rPr lang="en-US" dirty="0" smtClean="0"/>
-              <a:t> </a:t>
-            </a:r>
-            <a:r>
-              <a:rPr lang="en-US" dirty="0" err="1" smtClean="0"/>
-              <a:t>nhiệm</a:t>
-            </a:r>
-            <a:r>
-              <a:rPr lang="en-US" dirty="0" smtClean="0"/>
-              <a:t> có thể </a:t>
-            </a:r>
-            <a:r>
-              <a:rPr lang="en-US" dirty="0" err="1" smtClean="0"/>
-              <a:t>chạy</a:t>
-            </a:r>
-            <a:r>
-              <a:rPr lang="en-US" dirty="0" smtClean="0"/>
-              <a:t> trên </a:t>
-            </a:r>
-            <a:r>
-              <a:rPr lang="en-US" dirty="0" err="1" smtClean="0"/>
-              <a:t>hệ</a:t>
-            </a:r>
-            <a:r>
-              <a:rPr lang="en-US" dirty="0" smtClean="0"/>
-              <a:t> </a:t>
-            </a:r>
-            <a:r>
-              <a:rPr lang="en-US" dirty="0" err="1" smtClean="0"/>
-              <a:t>thống</a:t>
-            </a:r>
-            <a:r>
-              <a:rPr lang="en-US" dirty="0" smtClean="0"/>
-              <a:t> single </a:t>
-            </a:r>
-            <a:r>
-              <a:rPr lang="en-US" dirty="0" smtClean="0"/>
-              <a:t>core</a:t>
-            </a:r>
-            <a:r>
-              <a:rPr lang="en-US" dirty="0" smtClean="0"/>
-              <a:t> </a:t>
-            </a:r>
-            <a:r>
-              <a:rPr lang="en-US" dirty="0" smtClean="0"/>
-              <a:t>không?</a:t>
+              <a:t> file system</a:t>
             </a:r>
             <a:endParaRPr lang="en-US" dirty="0"/>
           </a:p>
@@ -4557,7 +4397,7 @@
     </p:spTree>
     <p:extLst>
       <p:ext uri="{BB962C8B-B14F-4D97-AF65-F5344CB8AC3E}">
-        <p14:creationId xmlns:p14="http://schemas.microsoft.com/office/powerpoint/2010/main" val="2345156530"/>
+        <p14:creationId xmlns:p14="http://schemas.microsoft.com/office/powerpoint/2010/main" val="1803269243"/>
       </p:ext>
     </p:extLst>
   </p:cSld>
@@ -4586,12 +4426,12 @@
       </p:grpSpPr>
       <p:sp>
         <p:nvSpPr>
-          <p:cNvPr id="4" name="Content Placeholder 3"/>
-          <p:cNvSpPr>
-            <a:spLocks noGrp="1"/>
-          </p:cNvSpPr>
-          <p:nvPr>
-            <p:ph idx="1"/>
+          <p:cNvPr id="2" name="Title 1"/>
+          <p:cNvSpPr>
+            <a:spLocks noGrp="1"/>
+          </p:cNvSpPr>
+          <p:nvPr>
+            <p:ph type="title"/>
           </p:nvPr>
         </p:nvSpPr>
         <p:spPr/>
@@ -4601,296 +4441,275 @@
           <a:p>
             <a:r>
               <a:rPr lang="en-US" dirty="0" err="1" smtClean="0"/>
-              <a:t>Bắt</a:t>
-            </a:r>
-            <a:r>
-              <a:rPr lang="en-US" dirty="0" smtClean="0"/>
-              <a:t> </a:t>
-            </a:r>
-            <a:r>
-              <a:rPr lang="en-US" dirty="0" err="1" smtClean="0"/>
-              <a:t>đầu</a:t>
-            </a:r>
-            <a:r>
-              <a:rPr lang="en-US" dirty="0" smtClean="0"/>
-              <a:t> với thư </a:t>
-            </a:r>
-            <a:r>
-              <a:rPr lang="en-US" dirty="0" err="1" smtClean="0"/>
-              <a:t>mục</a:t>
-            </a:r>
-            <a:r>
-              <a:rPr lang="en-US" dirty="0" smtClean="0"/>
-              <a:t> root (</a:t>
-            </a:r>
-            <a:r>
-              <a:rPr lang="en-US" dirty="0" err="1" smtClean="0"/>
-              <a:t>giống</a:t>
-            </a:r>
-            <a:r>
-              <a:rPr lang="en-US" dirty="0" smtClean="0"/>
-              <a:t> với </a:t>
-            </a:r>
-            <a:r>
-              <a:rPr lang="en-US" dirty="0" err="1" smtClean="0"/>
-              <a:t>mycomputer</a:t>
-            </a:r>
-            <a:r>
-              <a:rPr lang="en-US" dirty="0" smtClean="0"/>
-              <a:t> trên Window). Từ root sẽ </a:t>
-            </a:r>
-            <a:r>
-              <a:rPr lang="en-US" dirty="0" err="1" smtClean="0"/>
-              <a:t>rẽ</a:t>
-            </a:r>
-            <a:r>
-              <a:rPr lang="en-US" dirty="0" smtClean="0"/>
-              <a:t> </a:t>
-            </a:r>
-            <a:r>
-              <a:rPr lang="en-US" dirty="0" err="1" smtClean="0"/>
-              <a:t>nhánh</a:t>
-            </a:r>
-            <a:r>
-              <a:rPr lang="en-US" dirty="0" smtClean="0"/>
-              <a:t> sang các folder </a:t>
-            </a:r>
-            <a:r>
-              <a:rPr lang="en-US" dirty="0" err="1" smtClean="0"/>
-              <a:t>khác</a:t>
-            </a:r>
-            <a:r>
-              <a:rPr lang="en-US" dirty="0" smtClean="0"/>
-              <a:t>. </a:t>
-            </a:r>
-            <a:r>
-              <a:rPr lang="en-US" dirty="0" err="1" smtClean="0"/>
-              <a:t>Mỗi</a:t>
-            </a:r>
-            <a:r>
-              <a:rPr lang="en-US" dirty="0" smtClean="0"/>
-              <a:t> folder dùng </a:t>
-            </a:r>
-            <a:r>
-              <a:rPr lang="en-US" dirty="0" err="1" smtClean="0"/>
-              <a:t>để</a:t>
-            </a:r>
-            <a:r>
-              <a:rPr lang="en-US" dirty="0" smtClean="0"/>
-              <a:t> </a:t>
-            </a:r>
-            <a:r>
-              <a:rPr lang="en-US" dirty="0" err="1" smtClean="0"/>
-              <a:t>chứa</a:t>
-            </a:r>
-            <a:r>
-              <a:rPr lang="en-US" dirty="0"/>
-              <a:t> </a:t>
-            </a:r>
-            <a:r>
-              <a:rPr lang="en-US" dirty="0" smtClean="0"/>
-              <a:t>các file với các </a:t>
-            </a:r>
-            <a:r>
-              <a:rPr lang="en-US" dirty="0" err="1" smtClean="0"/>
-              <a:t>mục</a:t>
-            </a:r>
-            <a:r>
-              <a:rPr lang="en-US" dirty="0" smtClean="0"/>
-              <a:t> </a:t>
-            </a:r>
-            <a:r>
-              <a:rPr lang="en-US" dirty="0" err="1" smtClean="0"/>
-              <a:t>đích</a:t>
-            </a:r>
-            <a:r>
-              <a:rPr lang="en-US" dirty="0" smtClean="0"/>
-              <a:t> </a:t>
-            </a:r>
-            <a:r>
-              <a:rPr lang="en-US" dirty="0" err="1" smtClean="0"/>
-              <a:t>khác</a:t>
-            </a:r>
-            <a:r>
-              <a:rPr lang="en-US" dirty="0" smtClean="0"/>
-              <a:t> </a:t>
-            </a:r>
-            <a:r>
-              <a:rPr lang="en-US" dirty="0" err="1" smtClean="0"/>
-              <a:t>nhau</a:t>
-            </a:r>
-            <a:r>
-              <a:rPr lang="en-US" dirty="0" smtClean="0"/>
-              <a:t>.</a:t>
+              <a:t>Thực</a:t>
+            </a:r>
+            <a:r>
+              <a:rPr lang="en-US" dirty="0" smtClean="0"/>
+              <a:t> </a:t>
+            </a:r>
+            <a:r>
+              <a:rPr lang="en-US" dirty="0" err="1" smtClean="0"/>
+              <a:t>hành</a:t>
             </a:r>
             <a:endParaRPr lang="en-US" dirty="0"/>
           </a:p>
         </p:txBody>
       </p:sp>
-      <p:pic>
-        <p:nvPicPr>
-          <p:cNvPr id="6" name="Picture 5"/>
-          <p:cNvPicPr>
-            <a:picLocks noChangeAspect="1"/>
-          </p:cNvPicPr>
-          <p:nvPr/>
-        </p:nvPicPr>
-        <p:blipFill>
-          <a:blip r:embed="rId2"/>
-          <a:stretch>
-            <a:fillRect/>
-          </a:stretch>
-        </p:blipFill>
-        <p:spPr>
-          <a:xfrm>
-            <a:off x="397563" y="2244924"/>
-            <a:ext cx="3067949" cy="1181100"/>
-          </a:xfrm>
-          <a:prstGeom prst="rect">
-            <a:avLst/>
-          </a:prstGeom>
-        </p:spPr>
-      </p:pic>
-      <p:sp>
-        <p:nvSpPr>
-          <p:cNvPr id="5" name="Text Placeholder 4"/>
-          <p:cNvSpPr>
-            <a:spLocks noGrp="1"/>
-          </p:cNvSpPr>
-          <p:nvPr>
-            <p:ph type="body" sz="half" idx="2"/>
-          </p:nvPr>
-        </p:nvSpPr>
-        <p:spPr>
-          <a:xfrm>
-            <a:off x="427382" y="2257425"/>
-            <a:ext cx="3008313" cy="1181099"/>
-          </a:xfrm>
-        </p:spPr>
-        <p:txBody>
-          <a:bodyPr/>
-          <a:lstStyle/>
-          <a:p>
-            <a:endParaRPr lang="en-US" dirty="0"/>
-          </a:p>
-        </p:txBody>
-      </p:sp>
-      <p:sp>
-        <p:nvSpPr>
-          <p:cNvPr id="2" name="Title 1"/>
-          <p:cNvSpPr>
-            <a:spLocks noGrp="1"/>
-          </p:cNvSpPr>
-          <p:nvPr>
-            <p:ph type="title"/>
+      <p:sp>
+        <p:nvSpPr>
+          <p:cNvPr id="4" name="Content Placeholder 3"/>
+          <p:cNvSpPr>
+            <a:spLocks noGrp="1"/>
+          </p:cNvSpPr>
+          <p:nvPr>
+            <p:ph idx="1"/>
           </p:nvPr>
         </p:nvSpPr>
         <p:spPr/>
         <p:txBody>
-          <a:bodyPr/>
-          <a:lstStyle/>
-          <a:p>
-            <a:r>
-              <a:rPr lang="en-US" dirty="0" err="1" smtClean="0"/>
-              <a:t>Hệ</a:t>
-            </a:r>
-            <a:r>
-              <a:rPr lang="en-US" dirty="0" smtClean="0"/>
-              <a:t> </a:t>
-            </a:r>
-            <a:r>
-              <a:rPr lang="en-US" dirty="0" err="1" smtClean="0"/>
-              <a:t>thống</a:t>
-            </a:r>
-            <a:r>
-              <a:rPr lang="en-US" dirty="0" smtClean="0"/>
-              <a:t> file system</a:t>
-            </a:r>
-            <a:endParaRPr lang="en-US" dirty="0"/>
-          </a:p>
-        </p:txBody>
-      </p:sp>
-    </p:spTree>
-    <p:extLst>
-      <p:ext uri="{BB962C8B-B14F-4D97-AF65-F5344CB8AC3E}">
-        <p14:creationId xmlns:p14="http://schemas.microsoft.com/office/powerpoint/2010/main" val="1803269243"/>
-      </p:ext>
-    </p:extLst>
-  </p:cSld>
-  <p:clrMapOvr>
-    <a:masterClrMapping/>
-  </p:clrMapOvr>
-</p:sld>
-</file>
-
-<file path=ppt/slides/slide12.xml><?xml version="1.0" encoding="utf-8"?>
-<p:sld xmlns:a="http://schemas.openxmlformats.org/drawingml/2006/main" xmlns:r="http://schemas.openxmlformats.org/officeDocument/2006/relationships" xmlns:p="http://schemas.openxmlformats.org/presentationml/2006/main">
-  <p:cSld>
-    <p:spTree>
-      <p:nvGrpSpPr>
-        <p:cNvPr id="1" name=""/>
-        <p:cNvGrpSpPr/>
-        <p:nvPr/>
-      </p:nvGrpSpPr>
-      <p:grpSpPr>
-        <a:xfrm>
-          <a:off x="0" y="0"/>
-          <a:ext cx="0" cy="0"/>
-          <a:chOff x="0" y="0"/>
-          <a:chExt cx="0" cy="0"/>
-        </a:xfrm>
-      </p:grpSpPr>
-      <p:sp>
-        <p:nvSpPr>
-          <p:cNvPr id="2" name="Title 1"/>
-          <p:cNvSpPr>
-            <a:spLocks noGrp="1"/>
-          </p:cNvSpPr>
-          <p:nvPr>
-            <p:ph type="title"/>
-          </p:nvPr>
-        </p:nvSpPr>
-        <p:spPr/>
-        <p:txBody>
-          <a:bodyPr/>
-          <a:lstStyle/>
-          <a:p>
-            <a:r>
-              <a:rPr lang="en-US" dirty="0" err="1" smtClean="0"/>
-              <a:t>Thực</a:t>
-            </a:r>
-            <a:r>
-              <a:rPr lang="en-US" dirty="0" smtClean="0"/>
-              <a:t> </a:t>
-            </a:r>
-            <a:r>
-              <a:rPr lang="en-US" dirty="0" err="1" smtClean="0"/>
-              <a:t>hành</a:t>
-            </a:r>
-            <a:endParaRPr lang="en-US" dirty="0"/>
-          </a:p>
-        </p:txBody>
-      </p:sp>
-      <p:sp>
-        <p:nvSpPr>
-          <p:cNvPr id="4" name="Content Placeholder 3"/>
-          <p:cNvSpPr>
-            <a:spLocks noGrp="1"/>
-          </p:cNvSpPr>
-          <p:nvPr>
-            <p:ph idx="1"/>
-          </p:nvPr>
-        </p:nvSpPr>
-        <p:spPr/>
-        <p:txBody>
           <a:bodyPr>
-            <a:normAutofit fontScale="70000" lnSpcReduction="20000"/>
+            <a:normAutofit fontScale="55000" lnSpcReduction="20000"/>
           </a:bodyPr>
           <a:lstStyle/>
           <a:p>
             <a:r>
-              <a:rPr lang="en-US" dirty="0" smtClean="0"/>
-              <a:t>Bài 1: </a:t>
+              <a:rPr lang="en-US" dirty="0" err="1" smtClean="0"/>
+              <a:t>Cài</a:t>
+            </a:r>
+            <a:r>
+              <a:rPr lang="en-US" dirty="0" smtClean="0"/>
+              <a:t> </a:t>
+            </a:r>
+            <a:r>
+              <a:rPr lang="en-US" dirty="0" err="1" smtClean="0"/>
+              <a:t>đặt</a:t>
+            </a:r>
+            <a:r>
+              <a:rPr lang="en-US" dirty="0" smtClean="0"/>
+              <a:t> </a:t>
+            </a:r>
+            <a:r>
+              <a:rPr lang="en-US" dirty="0" err="1" smtClean="0"/>
+              <a:t>môi</a:t>
+            </a:r>
+            <a:r>
+              <a:rPr lang="en-US" dirty="0" smtClean="0"/>
+              <a:t> </a:t>
+            </a:r>
+            <a:r>
+              <a:rPr lang="en-US" dirty="0" err="1" smtClean="0"/>
+              <a:t>trường</a:t>
+            </a:r>
+            <a:r>
+              <a:rPr lang="en-US" dirty="0" smtClean="0"/>
+              <a:t>: </a:t>
+            </a:r>
+            <a:r>
+              <a:rPr lang="en-US" dirty="0" err="1" smtClean="0"/>
+              <a:t>Cài</a:t>
+            </a:r>
+            <a:r>
+              <a:rPr lang="en-US" dirty="0" smtClean="0"/>
+              <a:t> </a:t>
+            </a:r>
+            <a:r>
+              <a:rPr lang="en-US" dirty="0" err="1" smtClean="0"/>
+              <a:t>đặt</a:t>
+            </a:r>
+            <a:r>
+              <a:rPr lang="en-US" dirty="0" smtClean="0"/>
+              <a:t> </a:t>
+            </a:r>
+            <a:r>
+              <a:rPr lang="en-US" dirty="0" err="1" smtClean="0"/>
+              <a:t>vmware</a:t>
+            </a:r>
+            <a:r>
+              <a:rPr lang="en-US" dirty="0" smtClean="0"/>
+              <a:t>, Ubuntu, </a:t>
+            </a:r>
+            <a:r>
+              <a:rPr lang="en-US" dirty="0" err="1" smtClean="0"/>
+              <a:t>Mobaxterm</a:t>
+            </a:r>
+            <a:r>
+              <a:rPr lang="en-US" dirty="0" smtClean="0"/>
+              <a:t> </a:t>
+            </a:r>
+            <a:r>
+              <a:rPr lang="en-US" dirty="0" err="1" smtClean="0"/>
+              <a:t>lên</a:t>
+            </a:r>
+            <a:r>
+              <a:rPr lang="en-US" dirty="0" smtClean="0"/>
+              <a:t> </a:t>
+            </a:r>
+            <a:r>
+              <a:rPr lang="en-US" dirty="0" err="1" smtClean="0"/>
+              <a:t>máy</a:t>
+            </a:r>
+            <a:r>
+              <a:rPr lang="en-US" dirty="0" smtClean="0"/>
+              <a:t> </a:t>
+            </a:r>
+            <a:r>
+              <a:rPr lang="en-US" dirty="0" err="1" smtClean="0"/>
+              <a:t>tính</a:t>
+            </a:r>
+            <a:r>
+              <a:rPr lang="en-US" dirty="0" smtClean="0"/>
+              <a:t>. Sau </a:t>
+            </a:r>
+            <a:r>
+              <a:rPr lang="en-US" dirty="0" err="1" smtClean="0"/>
+              <a:t>đó</a:t>
+            </a:r>
+            <a:r>
+              <a:rPr lang="en-US" dirty="0" smtClean="0"/>
+              <a:t> </a:t>
+            </a:r>
+            <a:r>
+              <a:rPr lang="en-US" dirty="0" err="1" smtClean="0"/>
+              <a:t>sử</a:t>
+            </a:r>
+            <a:r>
+              <a:rPr lang="en-US" dirty="0" smtClean="0"/>
+              <a:t> </a:t>
+            </a:r>
+            <a:r>
+              <a:rPr lang="en-US" dirty="0" err="1" smtClean="0"/>
+              <a:t>dụng</a:t>
+            </a:r>
+            <a:r>
+              <a:rPr lang="en-US" dirty="0" smtClean="0"/>
+              <a:t> </a:t>
+            </a:r>
+            <a:r>
+              <a:rPr lang="en-US" dirty="0" err="1" smtClean="0"/>
+              <a:t>MobaXterm</a:t>
+            </a:r>
+            <a:r>
+              <a:rPr lang="en-US" dirty="0" smtClean="0"/>
+              <a:t> </a:t>
+            </a:r>
+            <a:r>
+              <a:rPr lang="en-US" dirty="0" err="1" smtClean="0"/>
+              <a:t>để</a:t>
+            </a:r>
+            <a:r>
+              <a:rPr lang="en-US" dirty="0" smtClean="0"/>
+              <a:t> </a:t>
+            </a:r>
+            <a:r>
+              <a:rPr lang="en-US" dirty="0" err="1" smtClean="0"/>
+              <a:t>ssh</a:t>
+            </a:r>
+            <a:r>
+              <a:rPr lang="en-US" dirty="0" smtClean="0"/>
+              <a:t> </a:t>
+            </a:r>
+            <a:r>
+              <a:rPr lang="en-US" dirty="0" err="1" smtClean="0"/>
+              <a:t>vào</a:t>
+            </a:r>
+            <a:r>
+              <a:rPr lang="en-US" dirty="0" smtClean="0"/>
+              <a:t> Ubuntu. </a:t>
+            </a:r>
+            <a:r>
+              <a:rPr lang="en-US" dirty="0" err="1" smtClean="0"/>
+              <a:t>Cài</a:t>
+            </a:r>
+            <a:r>
+              <a:rPr lang="en-US" dirty="0" smtClean="0"/>
+              <a:t> </a:t>
+            </a:r>
+            <a:r>
+              <a:rPr lang="en-US" dirty="0" err="1" smtClean="0"/>
+              <a:t>đặt</a:t>
+            </a:r>
+            <a:r>
+              <a:rPr lang="en-US" dirty="0" smtClean="0"/>
+              <a:t> </a:t>
+            </a:r>
+            <a:r>
+              <a:rPr lang="en-US" dirty="0" err="1" smtClean="0"/>
+              <a:t>Rabpian</a:t>
+            </a:r>
+            <a:r>
+              <a:rPr lang="en-US" dirty="0" smtClean="0"/>
+              <a:t> </a:t>
+            </a:r>
+            <a:r>
+              <a:rPr lang="en-US" dirty="0" err="1" smtClean="0"/>
+              <a:t>cho</a:t>
+            </a:r>
+            <a:r>
+              <a:rPr lang="en-US" dirty="0" smtClean="0"/>
+              <a:t> board Orange Pi, </a:t>
+            </a:r>
+            <a:r>
+              <a:rPr lang="en-US" dirty="0" err="1" smtClean="0"/>
+              <a:t>chạy</a:t>
+            </a:r>
+            <a:r>
+              <a:rPr lang="en-US" dirty="0" smtClean="0"/>
+              <a:t> </a:t>
+            </a:r>
+            <a:r>
+              <a:rPr lang="en-US" dirty="0" err="1" smtClean="0"/>
+              <a:t>thử</a:t>
+            </a:r>
+            <a:r>
+              <a:rPr lang="en-US" dirty="0" smtClean="0"/>
+              <a:t> 1 </a:t>
+            </a:r>
+            <a:r>
+              <a:rPr lang="en-US" dirty="0" err="1" smtClean="0"/>
+              <a:t>chương</a:t>
+            </a:r>
+            <a:r>
+              <a:rPr lang="en-US" dirty="0" smtClean="0"/>
+              <a:t> </a:t>
+            </a:r>
+            <a:r>
+              <a:rPr lang="en-US" dirty="0" err="1" smtClean="0"/>
+              <a:t>trình</a:t>
+            </a:r>
+            <a:r>
+              <a:rPr lang="en-US" dirty="0" smtClean="0"/>
+              <a:t> hello world </a:t>
+            </a:r>
+            <a:r>
+              <a:rPr lang="en-US" dirty="0" err="1" smtClean="0"/>
+              <a:t>trên</a:t>
+            </a:r>
+            <a:r>
+              <a:rPr lang="en-US" dirty="0" smtClean="0"/>
+              <a:t> </a:t>
+            </a:r>
+            <a:r>
+              <a:rPr lang="en-US" dirty="0" err="1" smtClean="0"/>
+              <a:t>đó</a:t>
+            </a:r>
+            <a:r>
+              <a:rPr lang="en-US" smtClean="0"/>
+              <a:t>.</a:t>
+            </a:r>
+            <a:endParaRPr lang="en-US" smtClean="0"/>
+          </a:p>
+          <a:p>
+            <a:r>
+              <a:rPr lang="en-US" dirty="0" err="1" smtClean="0"/>
+              <a:t>Bài</a:t>
+            </a:r>
+            <a:r>
+              <a:rPr lang="en-US" dirty="0" smtClean="0"/>
+              <a:t> </a:t>
+            </a:r>
+            <a:r>
+              <a:rPr lang="en-US" dirty="0" smtClean="0"/>
+              <a:t>1: </a:t>
             </a:r>
             <a:r>
               <a:rPr lang="en-US" dirty="0" err="1" smtClean="0"/>
@@ -5049,7 +4868,7 @@
 </p:sld>
 </file>
 
-<file path=ppt/slides/slide13.xml><?xml version="1.0" encoding="utf-8"?>
+<file path=ppt/slides/slide12.xml><?xml version="1.0" encoding="utf-8"?>
 <p:sld xmlns:a="http://schemas.openxmlformats.org/drawingml/2006/main" xmlns:r="http://schemas.openxmlformats.org/officeDocument/2006/relationships" xmlns:p="http://schemas.openxmlformats.org/presentationml/2006/main">
   <p:cSld>
     <p:bg>
@@ -5164,7 +4983,7 @@
           <a:p>
             <a:fld id="{E3B08AF7-4237-6949-8335-F63F47C2C8CC}" type="slidenum">
               <a:rPr lang="en-US" smtClean="0"/>
-              <a:t>13</a:t>
+              <a:t>12</a:t>
             </a:fld>
             <a:endParaRPr lang="en-US" dirty="0"/>
           </a:p>
@@ -5224,7 +5043,7 @@
           <a:p>
             <a:r>
               <a:rPr lang="en-US" dirty="0" smtClean="0"/>
-              <a:t>Objective</a:t>
+              <a:t>Agenda</a:t>
             </a:r>
             <a:endParaRPr lang="en-US" dirty="0"/>
           </a:p>
@@ -5445,8 +5264,20 @@
           <a:lstStyle/>
           <a:p>
             <a:r>
-              <a:rPr lang="en-US" dirty="0" smtClean="0"/>
-              <a:t>Agenda</a:t>
+              <a:rPr lang="en-US" dirty="0" err="1" smtClean="0"/>
+              <a:t>Giới</a:t>
+            </a:r>
+            <a:r>
+              <a:rPr lang="en-US" dirty="0" smtClean="0"/>
+              <a:t> </a:t>
+            </a:r>
+            <a:r>
+              <a:rPr lang="en-US" dirty="0" err="1" smtClean="0"/>
+              <a:t>thiệu</a:t>
+            </a:r>
+            <a:r>
+              <a:rPr lang="en-US" dirty="0" smtClean="0"/>
+              <a:t> về khóa học</a:t>
             </a:r>
             <a:endParaRPr lang="en-US" dirty="0"/>
           </a:p>
@@ -5454,7 +5285,7 @@
       </p:sp>
       <p:sp>
         <p:nvSpPr>
-          <p:cNvPr id="3" name="Content Placeholder 2"/>
+          <p:cNvPr id="4" name="Content Placeholder 3"/>
           <p:cNvSpPr>
             <a:spLocks noGrp="1"/>
           </p:cNvSpPr>
@@ -5462,67 +5293,98 @@
             <p:ph idx="1"/>
           </p:nvPr>
         </p:nvSpPr>
-        <p:spPr>
-          <a:xfrm>
-            <a:off x="457200" y="868017"/>
-            <a:ext cx="8229600" cy="3726606"/>
-          </a:xfrm>
-        </p:spPr>
+        <p:spPr/>
         <p:txBody>
           <a:bodyPr>
-            <a:normAutofit fontScale="92500" lnSpcReduction="20000"/>
+            <a:normAutofit fontScale="85000" lnSpcReduction="10000"/>
           </a:bodyPr>
           <a:lstStyle/>
           <a:p>
             <a:r>
-              <a:rPr lang="en-US" dirty="0" err="1" smtClean="0"/>
-              <a:t>Giới</a:t>
-            </a:r>
-            <a:r>
-              <a:rPr lang="en-US" dirty="0" smtClean="0"/>
-              <a:t> </a:t>
-            </a:r>
-            <a:r>
-              <a:rPr lang="en-US" dirty="0" err="1" smtClean="0"/>
-              <a:t>thiệu</a:t>
-            </a:r>
-            <a:r>
-              <a:rPr lang="en-US" dirty="0" smtClean="0"/>
-              <a:t> về khóa học</a:t>
-            </a:r>
-          </a:p>
-          <a:p>
-            <a:r>
-              <a:rPr lang="en-US" dirty="0" err="1" smtClean="0"/>
-              <a:t>Giới</a:t>
-            </a:r>
-            <a:r>
-              <a:rPr lang="en-US" dirty="0" smtClean="0"/>
-              <a:t> </a:t>
-            </a:r>
-            <a:r>
-              <a:rPr lang="en-US" dirty="0" err="1" smtClean="0"/>
-              <a:t>thiệu</a:t>
-            </a:r>
-            <a:r>
-              <a:rPr lang="en-US" dirty="0" smtClean="0"/>
-              <a:t> về các </a:t>
-            </a:r>
-            <a:r>
-              <a:rPr lang="en-US" dirty="0" err="1" smtClean="0"/>
-              <a:t>hdh</a:t>
-            </a:r>
-            <a:r>
-              <a:rPr lang="en-US" dirty="0" smtClean="0"/>
-              <a:t> </a:t>
-            </a:r>
-            <a:r>
-              <a:rPr lang="en-US" dirty="0" err="1" smtClean="0"/>
-              <a:t>họ</a:t>
-            </a:r>
-            <a:r>
-              <a:rPr lang="en-US" dirty="0" smtClean="0"/>
-              <a:t> Unix</a:t>
+              <a:rPr lang="en-US" dirty="0" smtClean="0"/>
+              <a:t>Objective: Training Linux embedded cho </a:t>
+            </a:r>
+            <a:r>
+              <a:rPr lang="en-US" dirty="0" err="1" smtClean="0"/>
+              <a:t>những</a:t>
+            </a:r>
+            <a:r>
+              <a:rPr lang="en-US" dirty="0" smtClean="0"/>
+              <a:t> bạn có kiến </a:t>
+            </a:r>
+            <a:r>
+              <a:rPr lang="en-US" dirty="0" err="1" smtClean="0"/>
+              <a:t>thức</a:t>
+            </a:r>
+            <a:r>
+              <a:rPr lang="en-US" dirty="0" smtClean="0"/>
+              <a:t> tốt về C và MCU.</a:t>
+            </a:r>
+          </a:p>
+          <a:p>
+            <a:r>
+              <a:rPr lang="en-US" dirty="0" err="1" smtClean="0"/>
+              <a:t>Lộ</a:t>
+            </a:r>
+            <a:r>
+              <a:rPr lang="en-US" dirty="0" smtClean="0"/>
+              <a:t> trình: Khóa học chia làm 2 </a:t>
+            </a:r>
+            <a:r>
+              <a:rPr lang="en-US" dirty="0" err="1" smtClean="0"/>
+              <a:t>phần</a:t>
+            </a:r>
+            <a:r>
+              <a:rPr lang="en-US" dirty="0" smtClean="0"/>
+              <a:t>, </a:t>
+            </a:r>
+            <a:r>
+              <a:rPr lang="en-US" dirty="0" err="1" smtClean="0"/>
+              <a:t>phần</a:t>
+            </a:r>
+            <a:r>
+              <a:rPr lang="en-US" dirty="0" smtClean="0"/>
+              <a:t> 1 là </a:t>
+            </a:r>
+            <a:r>
+              <a:rPr lang="en-US" dirty="0" err="1" smtClean="0"/>
+              <a:t>kỹ</a:t>
+            </a:r>
+            <a:r>
+              <a:rPr lang="en-US" dirty="0" smtClean="0"/>
+              <a:t> </a:t>
+            </a:r>
+            <a:r>
+              <a:rPr lang="en-US" dirty="0" err="1" smtClean="0"/>
+              <a:t>thuật</a:t>
+            </a:r>
+            <a:r>
+              <a:rPr lang="en-US" dirty="0" smtClean="0"/>
+              <a:t> </a:t>
+            </a:r>
+            <a:r>
+              <a:rPr lang="en-US" dirty="0" err="1" smtClean="0"/>
+              <a:t>lập</a:t>
+            </a:r>
+            <a:r>
+              <a:rPr lang="en-US" dirty="0" smtClean="0"/>
+              <a:t> trình trên </a:t>
+            </a:r>
+            <a:r>
+              <a:rPr lang="en-US" dirty="0" err="1" smtClean="0"/>
+              <a:t>tầng</a:t>
+            </a:r>
+            <a:r>
+              <a:rPr lang="en-US" dirty="0" smtClean="0"/>
+              <a:t> user-space, </a:t>
+            </a:r>
+            <a:r>
+              <a:rPr lang="en-US" dirty="0" err="1" smtClean="0"/>
+              <a:t>phần</a:t>
+            </a:r>
+            <a:r>
+              <a:rPr lang="en-US" dirty="0" smtClean="0"/>
+              <a:t> 2 là device driver.</a:t>
             </a:r>
           </a:p>
           <a:p>
@@ -5532,100 +5394,73 @@
             </a:r>
             <a:r>
               <a:rPr lang="en-US" dirty="0" err="1" smtClean="0"/>
-              <a:t>chức</a:t>
-            </a:r>
-            <a:r>
-              <a:rPr lang="en-US" dirty="0" smtClean="0"/>
-              <a:t> </a:t>
-            </a:r>
-            <a:r>
-              <a:rPr lang="en-US" dirty="0" err="1" smtClean="0"/>
-              <a:t>năng</a:t>
-            </a:r>
-            <a:r>
-              <a:rPr lang="en-US" dirty="0" smtClean="0"/>
-              <a:t> chính của 1 </a:t>
-            </a:r>
-            <a:r>
-              <a:rPr lang="en-US" dirty="0" err="1" smtClean="0"/>
-              <a:t>hdh</a:t>
-            </a:r>
-            <a:endParaRPr lang="en-US" dirty="0" smtClean="0"/>
-          </a:p>
-          <a:p>
-            <a:r>
-              <a:rPr lang="en-US" dirty="0" smtClean="0"/>
-              <a:t>Kiến </a:t>
-            </a:r>
-            <a:r>
-              <a:rPr lang="en-US" dirty="0" err="1" smtClean="0"/>
-              <a:t>trúc</a:t>
-            </a:r>
-            <a:r>
-              <a:rPr lang="en-US" dirty="0" smtClean="0"/>
-              <a:t> </a:t>
-            </a:r>
-            <a:r>
-              <a:rPr lang="en-US" dirty="0" err="1" smtClean="0"/>
-              <a:t>hdh</a:t>
-            </a:r>
-            <a:r>
-              <a:rPr lang="en-US" dirty="0" smtClean="0"/>
-              <a:t> Linux</a:t>
-            </a:r>
-          </a:p>
-          <a:p>
-            <a:r>
-              <a:rPr lang="en-US" dirty="0" err="1" smtClean="0"/>
-              <a:t>Giao</a:t>
-            </a:r>
-            <a:r>
-              <a:rPr lang="en-US" dirty="0" smtClean="0"/>
-              <a:t> </a:t>
-            </a:r>
-            <a:r>
-              <a:rPr lang="en-US" dirty="0" err="1" smtClean="0"/>
-              <a:t>diện</a:t>
-            </a:r>
-            <a:r>
-              <a:rPr lang="en-US" dirty="0" smtClean="0"/>
-              <a:t> người sử dụng</a:t>
-            </a:r>
-          </a:p>
-          <a:p>
-            <a:r>
-              <a:rPr lang="en-US" dirty="0" err="1" smtClean="0"/>
-              <a:t>Chương</a:t>
-            </a:r>
-            <a:r>
-              <a:rPr lang="en-US" dirty="0" smtClean="0"/>
-              <a:t> trình và </a:t>
-            </a:r>
-            <a:r>
-              <a:rPr lang="en-US" dirty="0" err="1" smtClean="0"/>
-              <a:t>tiến</a:t>
-            </a:r>
-            <a:r>
-              <a:rPr lang="en-US" dirty="0" smtClean="0"/>
-              <a:t> trình</a:t>
-            </a:r>
-          </a:p>
-          <a:p>
-            <a:r>
-              <a:rPr lang="en-US" dirty="0" err="1"/>
-              <a:t>H</a:t>
-            </a:r>
-            <a:r>
-              <a:rPr lang="en-US" dirty="0" err="1" smtClean="0"/>
-              <a:t>ệ</a:t>
-            </a:r>
-            <a:r>
-              <a:rPr lang="en-US" dirty="0" smtClean="0"/>
-              <a:t> </a:t>
-            </a:r>
-            <a:r>
-              <a:rPr lang="en-US" dirty="0" err="1" smtClean="0"/>
-              <a:t>điều</a:t>
+              <a:t>sách</a:t>
+            </a:r>
+            <a:r>
+              <a:rPr lang="en-US" dirty="0" smtClean="0"/>
+              <a:t> tham </a:t>
+            </a:r>
+            <a:r>
+              <a:rPr lang="en-US" dirty="0" err="1" smtClean="0"/>
+              <a:t>khảo</a:t>
+            </a:r>
+            <a:r>
+              <a:rPr lang="en-US" dirty="0"/>
+              <a:t>: Advanced Programming in the UNIX Environment, Understanding the Linux Kernel và Linux Device </a:t>
+            </a:r>
+            <a:r>
+              <a:rPr lang="en-US" dirty="0" smtClean="0"/>
+              <a:t>Drivers.</a:t>
+            </a:r>
+          </a:p>
+          <a:p>
+            <a:r>
+              <a:rPr lang="en-US" dirty="0" smtClean="0"/>
+              <a:t>Thời </a:t>
+            </a:r>
+            <a:r>
+              <a:rPr lang="en-US" dirty="0" err="1" smtClean="0"/>
+              <a:t>lượng</a:t>
+            </a:r>
+            <a:r>
+              <a:rPr lang="en-US" dirty="0" smtClean="0"/>
+              <a:t> học: 22 </a:t>
+            </a:r>
+            <a:r>
+              <a:rPr lang="en-US" dirty="0" err="1" smtClean="0"/>
+              <a:t>buổi</a:t>
+            </a:r>
+            <a:r>
+              <a:rPr lang="en-US" dirty="0" smtClean="0"/>
+              <a:t>, 2h – 1 </a:t>
+            </a:r>
+            <a:r>
+              <a:rPr lang="en-US" dirty="0" err="1" smtClean="0"/>
+              <a:t>buổi</a:t>
+            </a:r>
+            <a:r>
+              <a:rPr lang="en-US" dirty="0" smtClean="0"/>
+              <a:t>, 40% </a:t>
+            </a:r>
+            <a:r>
+              <a:rPr lang="en-US" dirty="0" err="1" smtClean="0"/>
+              <a:t>lý</a:t>
+            </a:r>
+            <a:r>
+              <a:rPr lang="en-US" dirty="0" smtClean="0"/>
+              <a:t> </a:t>
+            </a:r>
+            <a:r>
+              <a:rPr lang="en-US" dirty="0" err="1" smtClean="0"/>
+              <a:t>thuyết</a:t>
+            </a:r>
+            <a:r>
+              <a:rPr lang="en-US" dirty="0" smtClean="0"/>
+              <a:t>, 60% </a:t>
+            </a:r>
+            <a:r>
+              <a:rPr lang="en-US" dirty="0" err="1" smtClean="0"/>
+              <a:t>thực</a:t>
             </a:r>
             <a:r>
               <a:rPr lang="en-US" dirty="0" smtClean="0"/>
@@ -5637,106 +5472,22 @@
             </a:r>
             <a:r>
               <a:rPr lang="en-US" dirty="0" smtClean="0"/>
-              <a:t> </a:t>
-            </a:r>
-            <a:r>
-              <a:rPr lang="en-US" dirty="0" err="1" smtClean="0"/>
-              <a:t>đa</a:t>
-            </a:r>
-            <a:r>
-              <a:rPr lang="en-US" dirty="0" smtClean="0"/>
-              <a:t> </a:t>
-            </a:r>
-            <a:r>
-              <a:rPr lang="en-US" dirty="0" err="1" smtClean="0"/>
-              <a:t>nhiệm</a:t>
-            </a:r>
-            <a:endParaRPr lang="en-US" dirty="0" smtClean="0"/>
-          </a:p>
-          <a:p>
-            <a:r>
-              <a:rPr lang="en-US" dirty="0" err="1" smtClean="0"/>
-              <a:t>Hệ</a:t>
-            </a:r>
-            <a:r>
-              <a:rPr lang="en-US" dirty="0" smtClean="0"/>
-              <a:t> </a:t>
-            </a:r>
-            <a:r>
-              <a:rPr lang="en-US" dirty="0" err="1" smtClean="0"/>
-              <a:t>thống</a:t>
-            </a:r>
-            <a:r>
-              <a:rPr lang="en-US" dirty="0" smtClean="0"/>
-              <a:t> file system</a:t>
+              <a:t> coding.</a:t>
             </a:r>
             <a:endParaRPr lang="en-US" dirty="0"/>
-          </a:p>
-        </p:txBody>
-      </p:sp>
-      <p:sp>
-        <p:nvSpPr>
-          <p:cNvPr id="4" name="Footer Placeholder 3"/>
-          <p:cNvSpPr>
-            <a:spLocks noGrp="1"/>
-          </p:cNvSpPr>
-          <p:nvPr>
-            <p:ph type="ftr" sz="quarter" idx="11"/>
-          </p:nvPr>
-        </p:nvSpPr>
-        <p:spPr/>
-        <p:txBody>
-          <a:bodyPr/>
-          <a:lstStyle/>
-          <a:p>
-            <a:r>
-              <a:rPr lang="en-US" smtClean="0"/>
-              <a:t>©FPT SOFTWARE - Corporate Training Center - Internal Use</a:t>
-            </a:r>
-            <a:endParaRPr lang="en-US"/>
-          </a:p>
-        </p:txBody>
-      </p:sp>
-      <p:sp>
-        <p:nvSpPr>
-          <p:cNvPr id="5" name="Slide Number Placeholder 4"/>
-          <p:cNvSpPr>
-            <a:spLocks noGrp="1"/>
-          </p:cNvSpPr>
-          <p:nvPr>
-            <p:ph type="sldNum" sz="quarter" idx="12"/>
-          </p:nvPr>
-        </p:nvSpPr>
-        <p:spPr/>
-        <p:txBody>
-          <a:bodyPr/>
-          <a:lstStyle/>
-          <a:p>
-            <a:fld id="{E3B08AF7-4237-6949-8335-F63F47C2C8CC}" type="slidenum">
-              <a:rPr lang="en-US" smtClean="0"/>
-              <a:t>3</a:t>
-            </a:fld>
-            <a:endParaRPr lang="en-US"/>
           </a:p>
         </p:txBody>
       </p:sp>
     </p:spTree>
     <p:extLst>
       <p:ext uri="{BB962C8B-B14F-4D97-AF65-F5344CB8AC3E}">
-        <p14:creationId xmlns:p14="http://schemas.microsoft.com/office/powerpoint/2010/main" val="1634213258"/>
+        <p14:creationId xmlns:p14="http://schemas.microsoft.com/office/powerpoint/2010/main" val="3164501729"/>
       </p:ext>
     </p:extLst>
   </p:cSld>
   <p:clrMapOvr>
     <a:masterClrMapping/>
   </p:clrMapOvr>
-  <p:timing>
-    <p:tnLst>
-      <p:par>
-        <p:cTn id="1" dur="indefinite" restart="never" nodeType="tmRoot"/>
-      </p:par>
-    </p:tnLst>
-  </p:timing>
 </p:sld>
 </file>
 
@@ -5786,7 +5537,23 @@
             </a:r>
             <a:r>
               <a:rPr lang="en-US" dirty="0" smtClean="0"/>
-              <a:t> về khóa học</a:t>
+              <a:t> về các </a:t>
+            </a:r>
+            <a:r>
+              <a:rPr lang="en-US" dirty="0" err="1" smtClean="0"/>
+              <a:t>hdh</a:t>
+            </a:r>
+            <a:r>
+              <a:rPr lang="en-US" dirty="0" smtClean="0"/>
+              <a:t> </a:t>
+            </a:r>
+            <a:r>
+              <a:rPr lang="en-US" dirty="0" err="1" smtClean="0"/>
+              <a:t>họ</a:t>
+            </a:r>
+            <a:r>
+              <a:rPr lang="en-US" dirty="0" smtClean="0"/>
+              <a:t> Unix</a:t>
             </a:r>
             <a:endParaRPr lang="en-US" dirty="0"/>
           </a:p>
@@ -5805,151 +5572,55 @@
         <p:spPr/>
         <p:txBody>
           <a:bodyPr>
-            <a:normAutofit fontScale="85000" lnSpcReduction="10000"/>
+            <a:normAutofit fontScale="92500" lnSpcReduction="20000"/>
           </a:bodyPr>
           <a:lstStyle/>
           <a:p>
             <a:r>
               <a:rPr lang="en-US" dirty="0" smtClean="0"/>
-              <a:t>Objective: Training Linux embedded cho </a:t>
-            </a:r>
-            <a:r>
-              <a:rPr lang="en-US" dirty="0" err="1" smtClean="0"/>
-              <a:t>những</a:t>
-            </a:r>
-            <a:r>
-              <a:rPr lang="en-US" dirty="0" smtClean="0"/>
-              <a:t> bạn có kiến </a:t>
-            </a:r>
-            <a:r>
-              <a:rPr lang="en-US" dirty="0" err="1" smtClean="0"/>
-              <a:t>thức</a:t>
-            </a:r>
-            <a:r>
-              <a:rPr lang="en-US" dirty="0" smtClean="0"/>
-              <a:t> tốt về C và MCU.</a:t>
-            </a:r>
-          </a:p>
-          <a:p>
-            <a:r>
-              <a:rPr lang="en-US" dirty="0" err="1" smtClean="0"/>
-              <a:t>Lộ</a:t>
-            </a:r>
-            <a:r>
-              <a:rPr lang="en-US" dirty="0" smtClean="0"/>
-              <a:t> trình: Khóa học chia làm 2 </a:t>
-            </a:r>
-            <a:r>
-              <a:rPr lang="en-US" dirty="0" err="1" smtClean="0"/>
-              <a:t>phần</a:t>
-            </a:r>
-            <a:r>
-              <a:rPr lang="en-US" dirty="0" smtClean="0"/>
-              <a:t>, </a:t>
-            </a:r>
-            <a:r>
-              <a:rPr lang="en-US" dirty="0" err="1" smtClean="0"/>
-              <a:t>phần</a:t>
-            </a:r>
-            <a:r>
-              <a:rPr lang="en-US" dirty="0" smtClean="0"/>
-              <a:t> 1 là </a:t>
-            </a:r>
-            <a:r>
-              <a:rPr lang="en-US" dirty="0" err="1" smtClean="0"/>
-              <a:t>kỹ</a:t>
-            </a:r>
-            <a:r>
-              <a:rPr lang="en-US" dirty="0" smtClean="0"/>
-              <a:t> </a:t>
-            </a:r>
-            <a:r>
-              <a:rPr lang="en-US" dirty="0" err="1" smtClean="0"/>
-              <a:t>thuật</a:t>
-            </a:r>
-            <a:r>
-              <a:rPr lang="en-US" dirty="0" smtClean="0"/>
-              <a:t> </a:t>
-            </a:r>
-            <a:r>
-              <a:rPr lang="en-US" dirty="0" err="1" smtClean="0"/>
-              <a:t>lập</a:t>
-            </a:r>
-            <a:r>
-              <a:rPr lang="en-US" dirty="0" smtClean="0"/>
-              <a:t> trình trên </a:t>
-            </a:r>
-            <a:r>
-              <a:rPr lang="en-US" dirty="0" err="1" smtClean="0"/>
-              <a:t>tầng</a:t>
-            </a:r>
-            <a:r>
-              <a:rPr lang="en-US" dirty="0" smtClean="0"/>
-              <a:t> user-space, </a:t>
-            </a:r>
-            <a:r>
-              <a:rPr lang="en-US" dirty="0" err="1" smtClean="0"/>
-              <a:t>phần</a:t>
-            </a:r>
-            <a:r>
-              <a:rPr lang="en-US" dirty="0" smtClean="0"/>
-              <a:t> 2 là device driver.</a:t>
-            </a:r>
-          </a:p>
-          <a:p>
-            <a:r>
-              <a:rPr lang="en-US" dirty="0" smtClean="0"/>
-              <a:t>Các </a:t>
-            </a:r>
-            <a:r>
-              <a:rPr lang="en-US" dirty="0" err="1" smtClean="0"/>
-              <a:t>sách</a:t>
-            </a:r>
-            <a:r>
-              <a:rPr lang="en-US" dirty="0" smtClean="0"/>
-              <a:t> tham </a:t>
-            </a:r>
-            <a:r>
-              <a:rPr lang="en-US" dirty="0" err="1" smtClean="0"/>
-              <a:t>khảo</a:t>
-            </a:r>
-            <a:r>
-              <a:rPr lang="en-US" dirty="0"/>
-              <a:t>: Advanced Programming in the UNIX Environment, Understanding the Linux Kernel và Linux Device </a:t>
-            </a:r>
-            <a:r>
-              <a:rPr lang="en-US" dirty="0" smtClean="0"/>
-              <a:t>Drivers.</a:t>
-            </a:r>
-          </a:p>
-          <a:p>
-            <a:r>
-              <a:rPr lang="en-US" dirty="0" smtClean="0"/>
-              <a:t>Thời </a:t>
-            </a:r>
-            <a:r>
-              <a:rPr lang="en-US" dirty="0" err="1" smtClean="0"/>
-              <a:t>lượng</a:t>
-            </a:r>
-            <a:r>
-              <a:rPr lang="en-US" dirty="0" smtClean="0"/>
-              <a:t> học: 22 </a:t>
-            </a:r>
-            <a:r>
-              <a:rPr lang="en-US" dirty="0" err="1" smtClean="0"/>
-              <a:t>buổi</a:t>
-            </a:r>
-            <a:r>
-              <a:rPr lang="en-US" dirty="0" smtClean="0"/>
-              <a:t>, 2h – 1 </a:t>
-            </a:r>
-            <a:r>
-              <a:rPr lang="en-US" dirty="0" err="1" smtClean="0"/>
-              <a:t>buổi</a:t>
-            </a:r>
-            <a:r>
-              <a:rPr lang="en-US" dirty="0" smtClean="0"/>
-              <a:t>, 40% </a:t>
+              <a:t>Ra </a:t>
+            </a:r>
+            <a:r>
+              <a:rPr lang="en-US" dirty="0" err="1" smtClean="0"/>
+              <a:t>đời</a:t>
+            </a:r>
+            <a:r>
+              <a:rPr lang="en-US" dirty="0" smtClean="0"/>
+              <a:t> </a:t>
+            </a:r>
+            <a:r>
+              <a:rPr lang="en-US" dirty="0" err="1" smtClean="0"/>
+              <a:t>vào</a:t>
+            </a:r>
+            <a:r>
+              <a:rPr lang="en-US" dirty="0" smtClean="0"/>
+              <a:t> năm 1973.</a:t>
+            </a:r>
+          </a:p>
+          <a:p>
+            <a:r>
+              <a:rPr lang="en-US" dirty="0" err="1" smtClean="0"/>
+              <a:t>Áp</a:t>
+            </a:r>
+            <a:r>
+              <a:rPr lang="en-US" dirty="0" smtClean="0"/>
+              <a:t> dụng </a:t>
+            </a:r>
+            <a:r>
+              <a:rPr lang="en-US" dirty="0" err="1" smtClean="0"/>
+              <a:t>rất</a:t>
+            </a:r>
+            <a:r>
+              <a:rPr lang="en-US" dirty="0" smtClean="0"/>
+              <a:t> </a:t>
+            </a:r>
+            <a:r>
+              <a:rPr lang="en-US" dirty="0" err="1" smtClean="0"/>
+              <a:t>nhiều</a:t>
+            </a:r>
+            <a:r>
+              <a:rPr lang="en-US" dirty="0" smtClean="0"/>
+              <a:t> </a:t>
             </a:r>
             <a:r>
               <a:rPr lang="en-US" dirty="0" err="1" smtClean="0"/>
@@ -5965,11 +5636,175 @@
             </a:r>
             <a:r>
               <a:rPr lang="en-US" dirty="0" smtClean="0"/>
-              <a:t>, 60% </a:t>
-            </a:r>
-            <a:r>
-              <a:rPr lang="en-US" dirty="0" err="1" smtClean="0"/>
-              <a:t>thực</a:t>
+              <a:t> </a:t>
+            </a:r>
+            <a:r>
+              <a:rPr lang="en-US" dirty="0" err="1" smtClean="0"/>
+              <a:t>toán</a:t>
+            </a:r>
+            <a:r>
+              <a:rPr lang="en-US" dirty="0" smtClean="0"/>
+              <a:t> học </a:t>
+            </a:r>
+            <a:r>
+              <a:rPr lang="en-US" dirty="0" err="1" smtClean="0"/>
+              <a:t>để</a:t>
+            </a:r>
+            <a:r>
+              <a:rPr lang="en-US" dirty="0" smtClean="0"/>
+              <a:t> </a:t>
+            </a:r>
+            <a:r>
+              <a:rPr lang="en-US" dirty="0" err="1" smtClean="0"/>
+              <a:t>tối</a:t>
+            </a:r>
+            <a:r>
+              <a:rPr lang="en-US" dirty="0" smtClean="0"/>
+              <a:t> </a:t>
+            </a:r>
+            <a:r>
+              <a:rPr lang="en-US" dirty="0" err="1" smtClean="0"/>
+              <a:t>ưu</a:t>
+            </a:r>
+            <a:r>
+              <a:rPr lang="en-US" dirty="0" smtClean="0"/>
+              <a:t> </a:t>
+            </a:r>
+            <a:r>
+              <a:rPr lang="en-US" dirty="0" err="1" smtClean="0"/>
+              <a:t>hoạt</a:t>
+            </a:r>
+            <a:r>
+              <a:rPr lang="en-US" dirty="0" smtClean="0"/>
+              <a:t> </a:t>
+            </a:r>
+            <a:r>
+              <a:rPr lang="en-US" dirty="0" err="1" smtClean="0"/>
+              <a:t>động</a:t>
+            </a:r>
+            <a:r>
+              <a:rPr lang="en-US" dirty="0" smtClean="0"/>
+              <a:t>.</a:t>
+            </a:r>
+          </a:p>
+          <a:p>
+            <a:r>
+              <a:rPr lang="en-US" dirty="0" smtClean="0"/>
+              <a:t>Được </a:t>
+            </a:r>
+            <a:r>
+              <a:rPr lang="en-US" dirty="0" err="1" smtClean="0"/>
+              <a:t>thiết</a:t>
+            </a:r>
+            <a:r>
+              <a:rPr lang="en-US" dirty="0" smtClean="0"/>
+              <a:t> </a:t>
+            </a:r>
+            <a:r>
+              <a:rPr lang="en-US" dirty="0" err="1" smtClean="0"/>
+              <a:t>kế</a:t>
+            </a:r>
+            <a:r>
+              <a:rPr lang="en-US" dirty="0" smtClean="0"/>
+              <a:t> </a:t>
+            </a:r>
+            <a:r>
+              <a:rPr lang="en-US" dirty="0" err="1" smtClean="0"/>
+              <a:t>để</a:t>
+            </a:r>
+            <a:r>
+              <a:rPr lang="en-US" dirty="0" smtClean="0"/>
+              <a:t> </a:t>
+            </a:r>
+            <a:r>
+              <a:rPr lang="en-US" dirty="0" err="1" smtClean="0"/>
+              <a:t>mở</a:t>
+            </a:r>
+            <a:r>
+              <a:rPr lang="en-US" dirty="0" smtClean="0"/>
+              <a:t> </a:t>
+            </a:r>
+            <a:r>
+              <a:rPr lang="en-US" dirty="0" err="1" smtClean="0"/>
+              <a:t>rộng</a:t>
+            </a:r>
+            <a:r>
+              <a:rPr lang="en-US" dirty="0" smtClean="0"/>
+              <a:t> cho các </a:t>
+            </a:r>
+            <a:r>
+              <a:rPr lang="en-US" dirty="0" err="1" smtClean="0"/>
+              <a:t>máy</a:t>
+            </a:r>
+            <a:r>
+              <a:rPr lang="en-US" dirty="0" smtClean="0"/>
+              <a:t> </a:t>
+            </a:r>
+            <a:r>
+              <a:rPr lang="en-US" dirty="0" err="1" smtClean="0"/>
+              <a:t>tính</a:t>
+            </a:r>
+            <a:r>
+              <a:rPr lang="en-US" dirty="0" smtClean="0"/>
+              <a:t> tương </a:t>
+            </a:r>
+            <a:r>
+              <a:rPr lang="en-US" dirty="0" err="1" smtClean="0"/>
+              <a:t>lai</a:t>
+            </a:r>
+            <a:r>
+              <a:rPr lang="en-US" dirty="0" smtClean="0"/>
+              <a:t>.</a:t>
+            </a:r>
+          </a:p>
+          <a:p>
+            <a:r>
+              <a:rPr lang="en-US" dirty="0" smtClean="0"/>
+              <a:t>Được </a:t>
+            </a:r>
+            <a:r>
+              <a:rPr lang="en-US" dirty="0" err="1" smtClean="0"/>
+              <a:t>kế</a:t>
+            </a:r>
+            <a:r>
+              <a:rPr lang="en-US" dirty="0" smtClean="0"/>
+              <a:t> </a:t>
+            </a:r>
+            <a:r>
+              <a:rPr lang="en-US" dirty="0" err="1" smtClean="0"/>
+              <a:t>thừa</a:t>
+            </a:r>
+            <a:r>
+              <a:rPr lang="en-US" dirty="0" smtClean="0"/>
+              <a:t> từ </a:t>
+            </a:r>
+            <a:r>
+              <a:rPr lang="en-US" dirty="0" err="1" smtClean="0"/>
+              <a:t>rất</a:t>
+            </a:r>
+            <a:r>
+              <a:rPr lang="en-US" dirty="0" smtClean="0"/>
+              <a:t> </a:t>
+            </a:r>
+            <a:r>
+              <a:rPr lang="en-US" dirty="0" err="1" smtClean="0"/>
+              <a:t>nhiều</a:t>
+            </a:r>
+            <a:r>
+              <a:rPr lang="en-US" dirty="0" smtClean="0"/>
+              <a:t> </a:t>
+            </a:r>
+            <a:r>
+              <a:rPr lang="en-US" dirty="0" err="1" smtClean="0"/>
+              <a:t>hệ</a:t>
+            </a:r>
+            <a:r>
+              <a:rPr lang="en-US" dirty="0" smtClean="0"/>
+              <a:t> </a:t>
+            </a:r>
+            <a:r>
+              <a:rPr lang="en-US" dirty="0" err="1" smtClean="0"/>
+              <a:t>điều</a:t>
             </a:r>
             <a:r>
               <a:rPr lang="en-US" dirty="0" smtClean="0"/>
@@ -5981,16 +5816,61 @@
             </a:r>
             <a:r>
               <a:rPr lang="en-US" dirty="0" smtClean="0"/>
-              <a:t> coding.</a:t>
-            </a:r>
-            <a:endParaRPr lang="en-US" dirty="0"/>
+              <a:t> </a:t>
+            </a:r>
+            <a:r>
+              <a:rPr lang="en-US" dirty="0" err="1" smtClean="0"/>
+              <a:t>hiện</a:t>
+            </a:r>
+            <a:r>
+              <a:rPr lang="en-US" dirty="0" smtClean="0"/>
+              <a:t> nay </a:t>
+            </a:r>
+            <a:r>
+              <a:rPr lang="en-US" dirty="0" err="1" smtClean="0"/>
+              <a:t>như</a:t>
+            </a:r>
+            <a:r>
+              <a:rPr lang="en-US" dirty="0" smtClean="0"/>
+              <a:t> Window, </a:t>
+            </a:r>
+            <a:r>
+              <a:rPr lang="en-US" dirty="0" err="1" smtClean="0"/>
+              <a:t>MacOS</a:t>
+            </a:r>
+            <a:r>
+              <a:rPr lang="en-US" dirty="0" smtClean="0"/>
+              <a:t>, Linux,…</a:t>
+            </a:r>
+          </a:p>
+          <a:p>
+            <a:r>
+              <a:rPr lang="en-US" dirty="0" smtClean="0"/>
+              <a:t>Lập trình trên Linux </a:t>
+            </a:r>
+            <a:r>
+              <a:rPr lang="en-US" dirty="0" err="1" smtClean="0"/>
+              <a:t>rất</a:t>
+            </a:r>
+            <a:r>
+              <a:rPr lang="en-US" dirty="0" smtClean="0"/>
+              <a:t> </a:t>
+            </a:r>
+            <a:r>
+              <a:rPr lang="en-US" dirty="0" err="1" smtClean="0"/>
+              <a:t>giống</a:t>
+            </a:r>
+            <a:r>
+              <a:rPr lang="en-US" dirty="0" smtClean="0"/>
+              <a:t> với Unix.</a:t>
+            </a:r>
           </a:p>
         </p:txBody>
       </p:sp>
     </p:spTree>
     <p:extLst>
       <p:ext uri="{BB962C8B-B14F-4D97-AF65-F5344CB8AC3E}">
-        <p14:creationId xmlns:p14="http://schemas.microsoft.com/office/powerpoint/2010/main" val="3164501729"/>
+        <p14:creationId xmlns:p14="http://schemas.microsoft.com/office/powerpoint/2010/main" val="1038967562"/>
       </p:ext>
     </p:extLst>
   </p:cSld>
@@ -6019,395 +5899,6 @@
       </p:grpSpPr>
       <p:sp>
         <p:nvSpPr>
-          <p:cNvPr id="2" name="Title 1"/>
-          <p:cNvSpPr>
-            <a:spLocks noGrp="1"/>
-          </p:cNvSpPr>
-          <p:nvPr>
-            <p:ph type="title"/>
-          </p:nvPr>
-        </p:nvSpPr>
-        <p:spPr/>
-        <p:txBody>
-          <a:bodyPr/>
-          <a:lstStyle/>
-          <a:p>
-            <a:r>
-              <a:rPr lang="en-US" dirty="0" err="1" smtClean="0"/>
-              <a:t>Giới</a:t>
-            </a:r>
-            <a:r>
-              <a:rPr lang="en-US" dirty="0" smtClean="0"/>
-              <a:t> </a:t>
-            </a:r>
-            <a:r>
-              <a:rPr lang="en-US" dirty="0" err="1" smtClean="0"/>
-              <a:t>thiệu</a:t>
-            </a:r>
-            <a:r>
-              <a:rPr lang="en-US" dirty="0" smtClean="0"/>
-              <a:t> về các </a:t>
-            </a:r>
-            <a:r>
-              <a:rPr lang="en-US" dirty="0" err="1" smtClean="0"/>
-              <a:t>hdh</a:t>
-            </a:r>
-            <a:r>
-              <a:rPr lang="en-US" dirty="0" smtClean="0"/>
-              <a:t> </a:t>
-            </a:r>
-            <a:r>
-              <a:rPr lang="en-US" dirty="0" err="1" smtClean="0"/>
-              <a:t>họ</a:t>
-            </a:r>
-            <a:r>
-              <a:rPr lang="en-US" dirty="0" smtClean="0"/>
-              <a:t> Unix</a:t>
-            </a:r>
-            <a:endParaRPr lang="en-US" dirty="0"/>
-          </a:p>
-        </p:txBody>
-      </p:sp>
-      <p:sp>
-        <p:nvSpPr>
-          <p:cNvPr id="4" name="Content Placeholder 3"/>
-          <p:cNvSpPr>
-            <a:spLocks noGrp="1"/>
-          </p:cNvSpPr>
-          <p:nvPr>
-            <p:ph idx="1"/>
-          </p:nvPr>
-        </p:nvSpPr>
-        <p:spPr/>
-        <p:txBody>
-          <a:bodyPr>
-            <a:normAutofit fontScale="92500" lnSpcReduction="20000"/>
-          </a:bodyPr>
-          <a:lstStyle/>
-          <a:p>
-            <a:r>
-              <a:rPr lang="en-US" dirty="0" smtClean="0"/>
-              <a:t>Ra </a:t>
-            </a:r>
-            <a:r>
-              <a:rPr lang="en-US" dirty="0" err="1" smtClean="0"/>
-              <a:t>đời</a:t>
-            </a:r>
-            <a:r>
-              <a:rPr lang="en-US" dirty="0" smtClean="0"/>
-              <a:t> </a:t>
-            </a:r>
-            <a:r>
-              <a:rPr lang="en-US" dirty="0" err="1" smtClean="0"/>
-              <a:t>vào</a:t>
-            </a:r>
-            <a:r>
-              <a:rPr lang="en-US" dirty="0" smtClean="0"/>
-              <a:t> năm 1973.</a:t>
-            </a:r>
-          </a:p>
-          <a:p>
-            <a:r>
-              <a:rPr lang="en-US" dirty="0" err="1" smtClean="0"/>
-              <a:t>Áp</a:t>
-            </a:r>
-            <a:r>
-              <a:rPr lang="en-US" dirty="0" smtClean="0"/>
-              <a:t> dụng </a:t>
-            </a:r>
-            <a:r>
-              <a:rPr lang="en-US" dirty="0" err="1" smtClean="0"/>
-              <a:t>rất</a:t>
-            </a:r>
-            <a:r>
-              <a:rPr lang="en-US" dirty="0" smtClean="0"/>
-              <a:t> </a:t>
-            </a:r>
-            <a:r>
-              <a:rPr lang="en-US" dirty="0" err="1" smtClean="0"/>
-              <a:t>nhiều</a:t>
-            </a:r>
-            <a:r>
-              <a:rPr lang="en-US" dirty="0" smtClean="0"/>
-              <a:t> </a:t>
-            </a:r>
-            <a:r>
-              <a:rPr lang="en-US" dirty="0" err="1" smtClean="0"/>
-              <a:t>lý</a:t>
-            </a:r>
-            <a:r>
-              <a:rPr lang="en-US" dirty="0" smtClean="0"/>
-              <a:t> </a:t>
-            </a:r>
-            <a:r>
-              <a:rPr lang="en-US" dirty="0" err="1" smtClean="0"/>
-              <a:t>thuyết</a:t>
-            </a:r>
-            <a:r>
-              <a:rPr lang="en-US" dirty="0" smtClean="0"/>
-              <a:t> </a:t>
-            </a:r>
-            <a:r>
-              <a:rPr lang="en-US" dirty="0" err="1" smtClean="0"/>
-              <a:t>toán</a:t>
-            </a:r>
-            <a:r>
-              <a:rPr lang="en-US" dirty="0" smtClean="0"/>
-              <a:t> học </a:t>
-            </a:r>
-            <a:r>
-              <a:rPr lang="en-US" dirty="0" err="1" smtClean="0"/>
-              <a:t>để</a:t>
-            </a:r>
-            <a:r>
-              <a:rPr lang="en-US" dirty="0" smtClean="0"/>
-              <a:t> </a:t>
-            </a:r>
-            <a:r>
-              <a:rPr lang="en-US" dirty="0" err="1" smtClean="0"/>
-              <a:t>tối</a:t>
-            </a:r>
-            <a:r>
-              <a:rPr lang="en-US" dirty="0" smtClean="0"/>
-              <a:t> </a:t>
-            </a:r>
-            <a:r>
-              <a:rPr lang="en-US" dirty="0" err="1" smtClean="0"/>
-              <a:t>ưu</a:t>
-            </a:r>
-            <a:r>
-              <a:rPr lang="en-US" dirty="0" smtClean="0"/>
-              <a:t> </a:t>
-            </a:r>
-            <a:r>
-              <a:rPr lang="en-US" dirty="0" err="1" smtClean="0"/>
-              <a:t>hoạt</a:t>
-            </a:r>
-            <a:r>
-              <a:rPr lang="en-US" dirty="0" smtClean="0"/>
-              <a:t> </a:t>
-            </a:r>
-            <a:r>
-              <a:rPr lang="en-US" dirty="0" err="1" smtClean="0"/>
-              <a:t>động</a:t>
-            </a:r>
-            <a:r>
-              <a:rPr lang="en-US" dirty="0" smtClean="0"/>
-              <a:t>.</a:t>
-            </a:r>
-          </a:p>
-          <a:p>
-            <a:r>
-              <a:rPr lang="en-US" dirty="0" smtClean="0"/>
-              <a:t>Được </a:t>
-            </a:r>
-            <a:r>
-              <a:rPr lang="en-US" dirty="0" err="1" smtClean="0"/>
-              <a:t>thiết</a:t>
-            </a:r>
-            <a:r>
-              <a:rPr lang="en-US" dirty="0" smtClean="0"/>
-              <a:t> </a:t>
-            </a:r>
-            <a:r>
-              <a:rPr lang="en-US" dirty="0" err="1" smtClean="0"/>
-              <a:t>kế</a:t>
-            </a:r>
-            <a:r>
-              <a:rPr lang="en-US" dirty="0" smtClean="0"/>
-              <a:t> </a:t>
-            </a:r>
-            <a:r>
-              <a:rPr lang="en-US" dirty="0" err="1" smtClean="0"/>
-              <a:t>để</a:t>
-            </a:r>
-            <a:r>
-              <a:rPr lang="en-US" dirty="0" smtClean="0"/>
-              <a:t> </a:t>
-            </a:r>
-            <a:r>
-              <a:rPr lang="en-US" dirty="0" err="1" smtClean="0"/>
-              <a:t>mở</a:t>
-            </a:r>
-            <a:r>
-              <a:rPr lang="en-US" dirty="0" smtClean="0"/>
-              <a:t> </a:t>
-            </a:r>
-            <a:r>
-              <a:rPr lang="en-US" dirty="0" err="1" smtClean="0"/>
-              <a:t>rộng</a:t>
-            </a:r>
-            <a:r>
-              <a:rPr lang="en-US" dirty="0" smtClean="0"/>
-              <a:t> cho các </a:t>
-            </a:r>
-            <a:r>
-              <a:rPr lang="en-US" dirty="0" err="1" smtClean="0"/>
-              <a:t>máy</a:t>
-            </a:r>
-            <a:r>
-              <a:rPr lang="en-US" dirty="0" smtClean="0"/>
-              <a:t> </a:t>
-            </a:r>
-            <a:r>
-              <a:rPr lang="en-US" dirty="0" err="1" smtClean="0"/>
-              <a:t>tính</a:t>
-            </a:r>
-            <a:r>
-              <a:rPr lang="en-US" dirty="0" smtClean="0"/>
-              <a:t> tương </a:t>
-            </a:r>
-            <a:r>
-              <a:rPr lang="en-US" dirty="0" err="1" smtClean="0"/>
-              <a:t>lai</a:t>
-            </a:r>
-            <a:r>
-              <a:rPr lang="en-US" dirty="0" smtClean="0"/>
-              <a:t>.</a:t>
-            </a:r>
-          </a:p>
-          <a:p>
-            <a:r>
-              <a:rPr lang="en-US" dirty="0" smtClean="0"/>
-              <a:t>Được </a:t>
-            </a:r>
-            <a:r>
-              <a:rPr lang="en-US" dirty="0" err="1" smtClean="0"/>
-              <a:t>kế</a:t>
-            </a:r>
-            <a:r>
-              <a:rPr lang="en-US" dirty="0" smtClean="0"/>
-              <a:t> </a:t>
-            </a:r>
-            <a:r>
-              <a:rPr lang="en-US" dirty="0" err="1" smtClean="0"/>
-              <a:t>thừa</a:t>
-            </a:r>
-            <a:r>
-              <a:rPr lang="en-US" dirty="0" smtClean="0"/>
-              <a:t> từ </a:t>
-            </a:r>
-            <a:r>
-              <a:rPr lang="en-US" dirty="0" err="1" smtClean="0"/>
-              <a:t>rất</a:t>
-            </a:r>
-            <a:r>
-              <a:rPr lang="en-US" dirty="0" smtClean="0"/>
-              <a:t> </a:t>
-            </a:r>
-            <a:r>
-              <a:rPr lang="en-US" dirty="0" err="1" smtClean="0"/>
-              <a:t>nhiều</a:t>
-            </a:r>
-            <a:r>
-              <a:rPr lang="en-US" dirty="0" smtClean="0"/>
-              <a:t> </a:t>
-            </a:r>
-            <a:r>
-              <a:rPr lang="en-US" dirty="0" err="1" smtClean="0"/>
-              <a:t>hệ</a:t>
-            </a:r>
-            <a:r>
-              <a:rPr lang="en-US" dirty="0" smtClean="0"/>
-              <a:t> </a:t>
-            </a:r>
-            <a:r>
-              <a:rPr lang="en-US" dirty="0" err="1" smtClean="0"/>
-              <a:t>điều</a:t>
-            </a:r>
-            <a:r>
-              <a:rPr lang="en-US" dirty="0" smtClean="0"/>
-              <a:t> </a:t>
-            </a:r>
-            <a:r>
-              <a:rPr lang="en-US" dirty="0" err="1" smtClean="0"/>
-              <a:t>hành</a:t>
-            </a:r>
-            <a:r>
-              <a:rPr lang="en-US" dirty="0" smtClean="0"/>
-              <a:t> </a:t>
-            </a:r>
-            <a:r>
-              <a:rPr lang="en-US" dirty="0" err="1" smtClean="0"/>
-              <a:t>hiện</a:t>
-            </a:r>
-            <a:r>
-              <a:rPr lang="en-US" dirty="0" smtClean="0"/>
-              <a:t> nay </a:t>
-            </a:r>
-            <a:r>
-              <a:rPr lang="en-US" dirty="0" err="1" smtClean="0"/>
-              <a:t>như</a:t>
-            </a:r>
-            <a:r>
-              <a:rPr lang="en-US" dirty="0" smtClean="0"/>
-              <a:t> Window, </a:t>
-            </a:r>
-            <a:r>
-              <a:rPr lang="en-US" dirty="0" err="1" smtClean="0"/>
-              <a:t>MacOS</a:t>
-            </a:r>
-            <a:r>
-              <a:rPr lang="en-US" dirty="0" smtClean="0"/>
-              <a:t>, Linux,…</a:t>
-            </a:r>
-          </a:p>
-          <a:p>
-            <a:r>
-              <a:rPr lang="en-US" dirty="0" smtClean="0"/>
-              <a:t>Lập trình trên Linux </a:t>
-            </a:r>
-            <a:r>
-              <a:rPr lang="en-US" dirty="0" err="1" smtClean="0"/>
-              <a:t>rất</a:t>
-            </a:r>
-            <a:r>
-              <a:rPr lang="en-US" dirty="0" smtClean="0"/>
-              <a:t> </a:t>
-            </a:r>
-            <a:r>
-              <a:rPr lang="en-US" dirty="0" err="1" smtClean="0"/>
-              <a:t>giống</a:t>
-            </a:r>
-            <a:r>
-              <a:rPr lang="en-US" dirty="0" smtClean="0"/>
-              <a:t> với Unix.</a:t>
-            </a:r>
-          </a:p>
-        </p:txBody>
-      </p:sp>
-    </p:spTree>
-    <p:extLst>
-      <p:ext uri="{BB962C8B-B14F-4D97-AF65-F5344CB8AC3E}">
-        <p14:creationId xmlns:p14="http://schemas.microsoft.com/office/powerpoint/2010/main" val="1038967562"/>
-      </p:ext>
-    </p:extLst>
-  </p:cSld>
-  <p:clrMapOvr>
-    <a:masterClrMapping/>
-  </p:clrMapOvr>
-</p:sld>
-</file>
-
-<file path=ppt/slides/slide6.xml><?xml version="1.0" encoding="utf-8"?>
-<p:sld xmlns:a="http://schemas.openxmlformats.org/drawingml/2006/main" xmlns:r="http://schemas.openxmlformats.org/officeDocument/2006/relationships" xmlns:p="http://schemas.openxmlformats.org/presentationml/2006/main">
-  <p:cSld>
-    <p:spTree>
-      <p:nvGrpSpPr>
-        <p:cNvPr id="1" name=""/>
-        <p:cNvGrpSpPr/>
-        <p:nvPr/>
-      </p:nvGrpSpPr>
-      <p:grpSpPr>
-        <a:xfrm>
-          <a:off x="0" y="0"/>
-          <a:ext cx="0" cy="0"/>
-          <a:chOff x="0" y="0"/>
-          <a:chExt cx="0" cy="0"/>
-        </a:xfrm>
-      </p:grpSpPr>
-      <p:sp>
-        <p:nvSpPr>
           <p:cNvPr id="3" name="Text Placeholder 2"/>
           <p:cNvSpPr>
             <a:spLocks noGrp="1"/>
@@ -6713,7 +6204,7 @@
 </p:sld>
 </file>
 
-<file path=ppt/slides/slide7.xml><?xml version="1.0" encoding="utf-8"?>
+<file path=ppt/slides/slide6.xml><?xml version="1.0" encoding="utf-8"?>
 <p:sld xmlns:a="http://schemas.openxmlformats.org/drawingml/2006/main" xmlns:r="http://schemas.openxmlformats.org/officeDocument/2006/relationships" xmlns:p="http://schemas.openxmlformats.org/presentationml/2006/main">
   <p:cSld>
     <p:spTree>
@@ -6976,7 +6467,7 @@
 </p:sld>
 </file>
 
-<file path=ppt/slides/slide8.xml><?xml version="1.0" encoding="utf-8"?>
+<file path=ppt/slides/slide7.xml><?xml version="1.0" encoding="utf-8"?>
 <p:sld xmlns:a="http://schemas.openxmlformats.org/drawingml/2006/main" xmlns:r="http://schemas.openxmlformats.org/officeDocument/2006/relationships" xmlns:p="http://schemas.openxmlformats.org/presentationml/2006/main">
   <p:cSld>
     <p:spTree>
@@ -7233,6 +6724,293 @@
 </p:sld>
 </file>
 
+<file path=ppt/slides/slide8.xml><?xml version="1.0" encoding="utf-8"?>
+<p:sld xmlns:a="http://schemas.openxmlformats.org/drawingml/2006/main" xmlns:r="http://schemas.openxmlformats.org/officeDocument/2006/relationships" xmlns:p="http://schemas.openxmlformats.org/presentationml/2006/main">
+  <p:cSld>
+    <p:spTree>
+      <p:nvGrpSpPr>
+        <p:cNvPr id="1" name=""/>
+        <p:cNvGrpSpPr/>
+        <p:nvPr/>
+      </p:nvGrpSpPr>
+      <p:grpSpPr>
+        <a:xfrm>
+          <a:off x="0" y="0"/>
+          <a:ext cx="0" cy="0"/>
+          <a:chOff x="0" y="0"/>
+          <a:chExt cx="0" cy="0"/>
+        </a:xfrm>
+      </p:grpSpPr>
+      <p:sp>
+        <p:nvSpPr>
+          <p:cNvPr id="2" name="Title 1"/>
+          <p:cNvSpPr>
+            <a:spLocks noGrp="1"/>
+          </p:cNvSpPr>
+          <p:nvPr>
+            <p:ph type="title"/>
+          </p:nvPr>
+        </p:nvSpPr>
+        <p:spPr/>
+        <p:txBody>
+          <a:bodyPr/>
+          <a:lstStyle/>
+          <a:p>
+            <a:r>
+              <a:rPr lang="sv-SE" dirty="0" smtClean="0"/>
+              <a:t>Chương trình và tiến trình</a:t>
+            </a:r>
+            <a:endParaRPr lang="sv-SE" dirty="0"/>
+          </a:p>
+        </p:txBody>
+      </p:sp>
+      <p:sp>
+        <p:nvSpPr>
+          <p:cNvPr id="3" name="Text Placeholder 2"/>
+          <p:cNvSpPr>
+            <a:spLocks noGrp="1"/>
+          </p:cNvSpPr>
+          <p:nvPr>
+            <p:ph idx="1"/>
+          </p:nvPr>
+        </p:nvSpPr>
+        <p:spPr/>
+        <p:txBody>
+          <a:bodyPr/>
+          <a:lstStyle/>
+          <a:p>
+            <a:pPr lvl="0"/>
+            <a:r>
+              <a:rPr lang="en-US" dirty="0" err="1" smtClean="0"/>
+              <a:t>Chương</a:t>
+            </a:r>
+            <a:r>
+              <a:rPr lang="en-US" dirty="0" smtClean="0"/>
+              <a:t> trình: Là các file binary được build từ source code và </a:t>
+            </a:r>
+            <a:r>
+              <a:rPr lang="en-US" dirty="0" err="1" smtClean="0"/>
+              <a:t>nằm</a:t>
+            </a:r>
+            <a:r>
+              <a:rPr lang="en-US" dirty="0" smtClean="0"/>
+              <a:t> trên ổ </a:t>
+            </a:r>
+            <a:r>
+              <a:rPr lang="en-US" dirty="0" err="1" smtClean="0"/>
+              <a:t>cứng</a:t>
+            </a:r>
+            <a:r>
+              <a:rPr lang="en-US" dirty="0" smtClean="0"/>
+              <a:t>.</a:t>
+            </a:r>
+          </a:p>
+          <a:p>
+            <a:pPr lvl="0"/>
+            <a:r>
+              <a:rPr lang="en-US" dirty="0" err="1" smtClean="0"/>
+              <a:t>Tiến</a:t>
+            </a:r>
+            <a:r>
+              <a:rPr lang="en-US" dirty="0" smtClean="0"/>
+              <a:t> trình: </a:t>
+            </a:r>
+            <a:r>
+              <a:rPr lang="en-US" dirty="0" err="1" smtClean="0"/>
+              <a:t>Chúng</a:t>
+            </a:r>
+            <a:r>
+              <a:rPr lang="en-US" dirty="0" smtClean="0"/>
+              <a:t> là các </a:t>
+            </a:r>
+            <a:r>
+              <a:rPr lang="en-US" dirty="0" err="1" smtClean="0"/>
+              <a:t>chương</a:t>
+            </a:r>
+            <a:r>
+              <a:rPr lang="en-US" dirty="0" smtClean="0"/>
+              <a:t> trình </a:t>
+            </a:r>
+            <a:r>
+              <a:rPr lang="en-US" dirty="0" err="1" smtClean="0"/>
+              <a:t>đã</a:t>
+            </a:r>
+            <a:r>
+              <a:rPr lang="en-US" dirty="0" smtClean="0"/>
+              <a:t> được load </a:t>
+            </a:r>
+            <a:r>
+              <a:rPr lang="en-US" dirty="0" err="1" smtClean="0"/>
+              <a:t>vào</a:t>
+            </a:r>
+            <a:r>
+              <a:rPr lang="en-US" dirty="0" smtClean="0"/>
+              <a:t> </a:t>
+            </a:r>
+            <a:r>
+              <a:rPr lang="en-US" dirty="0" err="1" smtClean="0"/>
+              <a:t>hệ</a:t>
+            </a:r>
+            <a:r>
+              <a:rPr lang="en-US" dirty="0" smtClean="0"/>
+              <a:t> </a:t>
+            </a:r>
+            <a:r>
+              <a:rPr lang="en-US" dirty="0" err="1" smtClean="0"/>
+              <a:t>thống</a:t>
+            </a:r>
+            <a:r>
+              <a:rPr lang="en-US" dirty="0" smtClean="0"/>
+              <a:t>. </a:t>
+            </a:r>
+            <a:r>
+              <a:rPr lang="en-US" dirty="0" err="1" smtClean="0"/>
+              <a:t>Chúng</a:t>
+            </a:r>
+            <a:r>
+              <a:rPr lang="en-US" dirty="0" smtClean="0"/>
+              <a:t> </a:t>
+            </a:r>
+            <a:r>
+              <a:rPr lang="en-US" dirty="0" err="1" smtClean="0"/>
+              <a:t>bắt</a:t>
+            </a:r>
+            <a:r>
+              <a:rPr lang="en-US" dirty="0" smtClean="0"/>
+              <a:t> </a:t>
+            </a:r>
+            <a:r>
+              <a:rPr lang="en-US" dirty="0" err="1" smtClean="0"/>
+              <a:t>đầu</a:t>
+            </a:r>
+            <a:r>
+              <a:rPr lang="en-US" dirty="0" smtClean="0"/>
+              <a:t> sử dụng và </a:t>
+            </a:r>
+            <a:r>
+              <a:rPr lang="en-US" dirty="0" err="1" smtClean="0"/>
+              <a:t>tiêu</a:t>
+            </a:r>
+            <a:r>
+              <a:rPr lang="en-US" dirty="0" smtClean="0"/>
+              <a:t> </a:t>
+            </a:r>
+            <a:r>
+              <a:rPr lang="en-US" dirty="0" err="1" smtClean="0"/>
+              <a:t>thụ</a:t>
+            </a:r>
+            <a:r>
+              <a:rPr lang="en-US" dirty="0" smtClean="0"/>
+              <a:t> </a:t>
+            </a:r>
+            <a:r>
+              <a:rPr lang="en-US" dirty="0" err="1" smtClean="0"/>
+              <a:t>tài</a:t>
+            </a:r>
+            <a:r>
+              <a:rPr lang="en-US" dirty="0" smtClean="0"/>
+              <a:t> </a:t>
+            </a:r>
+            <a:r>
+              <a:rPr lang="en-US" dirty="0" err="1" smtClean="0"/>
+              <a:t>nguyên</a:t>
+            </a:r>
+            <a:r>
+              <a:rPr lang="en-US" dirty="0" smtClean="0"/>
+              <a:t> của </a:t>
+            </a:r>
+            <a:r>
+              <a:rPr lang="en-US" dirty="0" err="1" smtClean="0"/>
+              <a:t>hệ</a:t>
+            </a:r>
+            <a:r>
+              <a:rPr lang="en-US" dirty="0" smtClean="0"/>
+              <a:t> </a:t>
+            </a:r>
+            <a:r>
+              <a:rPr lang="en-US" dirty="0" err="1" smtClean="0"/>
+              <a:t>thống</a:t>
+            </a:r>
+            <a:r>
+              <a:rPr lang="en-US" dirty="0" smtClean="0"/>
+              <a:t>.</a:t>
+            </a:r>
+          </a:p>
+          <a:p>
+            <a:pPr lvl="0"/>
+            <a:r>
+              <a:rPr lang="en-US" dirty="0" err="1" smtClean="0"/>
+              <a:t>Câu</a:t>
+            </a:r>
+            <a:r>
+              <a:rPr lang="en-US" dirty="0" smtClean="0"/>
+              <a:t> hỏi </a:t>
+            </a:r>
+            <a:r>
+              <a:rPr lang="en-US" dirty="0" err="1" smtClean="0"/>
+              <a:t>pv</a:t>
+            </a:r>
+            <a:r>
+              <a:rPr lang="en-US" dirty="0" smtClean="0"/>
+              <a:t>: </a:t>
+            </a:r>
+            <a:r>
+              <a:rPr lang="en-US" dirty="0" err="1" smtClean="0"/>
+              <a:t>Chương</a:t>
+            </a:r>
+            <a:r>
+              <a:rPr lang="en-US" dirty="0" smtClean="0"/>
+              <a:t> trình và </a:t>
+            </a:r>
+            <a:r>
+              <a:rPr lang="en-US" dirty="0" err="1" smtClean="0"/>
+              <a:t>tiến</a:t>
+            </a:r>
+            <a:r>
+              <a:rPr lang="en-US" dirty="0" smtClean="0"/>
+              <a:t> trình </a:t>
+            </a:r>
+            <a:r>
+              <a:rPr lang="en-US" dirty="0" err="1" smtClean="0"/>
+              <a:t>khác</a:t>
+            </a:r>
+            <a:r>
+              <a:rPr lang="en-US" dirty="0" smtClean="0"/>
+              <a:t> </a:t>
+            </a:r>
+            <a:r>
+              <a:rPr lang="en-US" dirty="0" err="1" smtClean="0"/>
+              <a:t>nhau</a:t>
+            </a:r>
+            <a:r>
+              <a:rPr lang="en-US" dirty="0" smtClean="0"/>
+              <a:t> </a:t>
+            </a:r>
+            <a:r>
+              <a:rPr lang="en-US" dirty="0" err="1" smtClean="0"/>
+              <a:t>ntn</a:t>
+            </a:r>
+            <a:r>
+              <a:rPr lang="en-US" dirty="0" smtClean="0"/>
+              <a:t>?</a:t>
+            </a:r>
+            <a:endParaRPr lang="en-US" dirty="0"/>
+          </a:p>
+        </p:txBody>
+      </p:sp>
+    </p:spTree>
+    <p:extLst>
+      <p:ext uri="{BB962C8B-B14F-4D97-AF65-F5344CB8AC3E}">
+        <p14:creationId xmlns:p14="http://schemas.microsoft.com/office/powerpoint/2010/main" val="400591153"/>
+      </p:ext>
+    </p:extLst>
+  </p:cSld>
+  <p:clrMapOvr>
+    <a:masterClrMapping/>
+  </p:clrMapOvr>
+</p:sld>
+</file>
+
 <file path=ppt/slides/slide9.xml><?xml version="1.0" encoding="utf-8"?>
 <p:sld xmlns:a="http://schemas.openxmlformats.org/drawingml/2006/main" xmlns:r="http://schemas.openxmlformats.org/officeDocument/2006/relationships" xmlns:p="http://schemas.openxmlformats.org/presentationml/2006/main">
   <p:cSld>
@@ -7266,10 +7044,42 @@
           <a:lstStyle/>
           <a:p>
             <a:r>
-              <a:rPr lang="sv-SE" dirty="0" smtClean="0"/>
-              <a:t>Chương trình và tiến trình</a:t>
-            </a:r>
-            <a:endParaRPr lang="sv-SE" dirty="0"/>
+              <a:rPr lang="fr-FR" dirty="0" err="1" smtClean="0"/>
+              <a:t>Hệ</a:t>
+            </a:r>
+            <a:r>
+              <a:rPr lang="fr-FR" dirty="0" smtClean="0"/>
+              <a:t> </a:t>
+            </a:r>
+            <a:r>
+              <a:rPr lang="fr-FR" dirty="0" err="1" smtClean="0"/>
+              <a:t>điều</a:t>
+            </a:r>
+            <a:r>
+              <a:rPr lang="fr-FR" dirty="0" smtClean="0"/>
+              <a:t> </a:t>
+            </a:r>
+            <a:r>
+              <a:rPr lang="fr-FR" dirty="0" err="1" smtClean="0"/>
+              <a:t>hành</a:t>
+            </a:r>
+            <a:r>
+              <a:rPr lang="fr-FR" dirty="0" smtClean="0"/>
+              <a:t> </a:t>
+            </a:r>
+            <a:r>
+              <a:rPr lang="fr-FR" dirty="0" err="1" smtClean="0"/>
+              <a:t>đa</a:t>
+            </a:r>
+            <a:r>
+              <a:rPr lang="fr-FR" dirty="0" smtClean="0"/>
+              <a:t> </a:t>
+            </a:r>
+            <a:r>
+              <a:rPr lang="fr-FR" dirty="0" err="1" smtClean="0"/>
+              <a:t>nhiệm</a:t>
+            </a:r>
+            <a:endParaRPr lang="fr-FR" dirty="0"/>
           </a:p>
         </p:txBody>
       </p:sp>
@@ -7290,24 +7100,52 @@
           <a:p>
             <a:pPr lvl="0"/>
             <a:r>
-              <a:rPr lang="en-US" dirty="0" err="1" smtClean="0"/>
-              <a:t>Chương</a:t>
-            </a:r>
-            <a:r>
-              <a:rPr lang="en-US" dirty="0" smtClean="0"/>
-              <a:t> trình: Là các file binary được build từ source code và </a:t>
-            </a:r>
-            <a:r>
-              <a:rPr lang="en-US" dirty="0" err="1" smtClean="0"/>
-              <a:t>nằm</a:t>
-            </a:r>
-            <a:r>
-              <a:rPr lang="en-US" dirty="0" smtClean="0"/>
-              <a:t> trên ổ </a:t>
-            </a:r>
-            <a:r>
-              <a:rPr lang="en-US" dirty="0" err="1" smtClean="0"/>
-              <a:t>cứng</a:t>
+              <a:rPr lang="en-US" dirty="0" smtClean="0"/>
+              <a:t>Idea: </a:t>
+            </a:r>
+            <a:r>
+              <a:rPr lang="en-US" dirty="0" err="1" smtClean="0"/>
+              <a:t>Bộ</a:t>
+            </a:r>
+            <a:r>
+              <a:rPr lang="en-US" dirty="0" smtClean="0"/>
+              <a:t> </a:t>
+            </a:r>
+            <a:r>
+              <a:rPr lang="en-US" dirty="0" err="1" smtClean="0"/>
+              <a:t>não</a:t>
+            </a:r>
+            <a:r>
+              <a:rPr lang="en-US" dirty="0" smtClean="0"/>
+              <a:t> của con người </a:t>
+            </a:r>
+            <a:r>
+              <a:rPr lang="en-US" dirty="0" err="1" smtClean="0"/>
+              <a:t>luôn</a:t>
+            </a:r>
+            <a:r>
+              <a:rPr lang="en-US" dirty="0" smtClean="0"/>
+              <a:t> </a:t>
+            </a:r>
+            <a:r>
+              <a:rPr lang="en-US" dirty="0" err="1" smtClean="0"/>
+              <a:t>chậm</a:t>
+            </a:r>
+            <a:r>
+              <a:rPr lang="en-US" dirty="0" smtClean="0"/>
+              <a:t> hơn </a:t>
+            </a:r>
+            <a:r>
+              <a:rPr lang="en-US" dirty="0" err="1" smtClean="0"/>
+              <a:t>máy</a:t>
+            </a:r>
+            <a:r>
+              <a:rPr lang="en-US" dirty="0" smtClean="0"/>
+              <a:t> </a:t>
+            </a:r>
+            <a:r>
+              <a:rPr lang="en-US" dirty="0" err="1" smtClean="0"/>
+              <a:t>tính</a:t>
             </a:r>
             <a:r>
               <a:rPr lang="en-US" dirty="0" smtClean="0"/>
@@ -7318,39 +7156,103 @@
             <a:pPr lvl="0"/>
             <a:r>
               <a:rPr lang="en-US" dirty="0" err="1" smtClean="0"/>
-              <a:t>Tiến</a:t>
-            </a:r>
-            <a:r>
-              <a:rPr lang="en-US" dirty="0" smtClean="0"/>
-              <a:t> trình: </a:t>
-            </a:r>
-            <a:r>
-              <a:rPr lang="en-US" dirty="0" err="1" smtClean="0"/>
-              <a:t>Chúng</a:t>
-            </a:r>
-            <a:r>
-              <a:rPr lang="en-US" dirty="0" smtClean="0"/>
-              <a:t> là các </a:t>
-            </a:r>
-            <a:r>
-              <a:rPr lang="en-US" dirty="0" err="1" smtClean="0"/>
-              <a:t>chương</a:t>
-            </a:r>
-            <a:r>
-              <a:rPr lang="en-US" dirty="0" smtClean="0"/>
-              <a:t> trình </a:t>
-            </a:r>
-            <a:r>
-              <a:rPr lang="en-US" dirty="0" err="1" smtClean="0"/>
-              <a:t>đã</a:t>
-            </a:r>
-            <a:r>
-              <a:rPr lang="en-US" dirty="0" smtClean="0"/>
-              <a:t> được load </a:t>
-            </a:r>
-            <a:r>
-              <a:rPr lang="en-US" dirty="0" err="1" smtClean="0"/>
-              <a:t>vào</a:t>
+              <a:t>Hệ</a:t>
+            </a:r>
+            <a:r>
+              <a:rPr lang="en-US" dirty="0" smtClean="0"/>
+              <a:t> </a:t>
+            </a:r>
+            <a:r>
+              <a:rPr lang="en-US" dirty="0" err="1" smtClean="0"/>
+              <a:t>điều</a:t>
+            </a:r>
+            <a:r>
+              <a:rPr lang="en-US" dirty="0" smtClean="0"/>
+              <a:t> </a:t>
+            </a:r>
+            <a:r>
+              <a:rPr lang="en-US" dirty="0" err="1" smtClean="0"/>
+              <a:t>hành</a:t>
+            </a:r>
+            <a:r>
+              <a:rPr lang="en-US" dirty="0" smtClean="0"/>
+              <a:t> </a:t>
+            </a:r>
+            <a:r>
+              <a:rPr lang="en-US" dirty="0" err="1" smtClean="0"/>
+              <a:t>đa</a:t>
+            </a:r>
+            <a:r>
+              <a:rPr lang="en-US" dirty="0" smtClean="0"/>
+              <a:t> </a:t>
+            </a:r>
+            <a:r>
+              <a:rPr lang="en-US" dirty="0" err="1" smtClean="0"/>
+              <a:t>nhiệm</a:t>
+            </a:r>
+            <a:r>
+              <a:rPr lang="en-US" dirty="0" smtClean="0"/>
+              <a:t>: Cho </a:t>
+            </a:r>
+            <a:r>
+              <a:rPr lang="en-US" dirty="0" err="1" smtClean="0"/>
+              <a:t>phép</a:t>
+            </a:r>
+            <a:r>
+              <a:rPr lang="en-US" dirty="0" smtClean="0"/>
+              <a:t> </a:t>
+            </a:r>
+            <a:r>
+              <a:rPr lang="en-US" dirty="0" err="1" smtClean="0"/>
+              <a:t>chuyển</a:t>
+            </a:r>
+            <a:r>
+              <a:rPr lang="en-US" dirty="0" smtClean="0"/>
+              <a:t> </a:t>
+            </a:r>
+            <a:r>
+              <a:rPr lang="en-US" dirty="0" err="1" smtClean="0"/>
+              <a:t>đổi</a:t>
+            </a:r>
+            <a:r>
+              <a:rPr lang="en-US" dirty="0" smtClean="0"/>
+              <a:t> </a:t>
+            </a:r>
+            <a:r>
+              <a:rPr lang="en-US" dirty="0" err="1" smtClean="0"/>
+              <a:t>giữa</a:t>
+            </a:r>
+            <a:r>
+              <a:rPr lang="en-US" dirty="0" smtClean="0"/>
+              <a:t> các task </a:t>
+            </a:r>
+            <a:r>
+              <a:rPr lang="en-US" dirty="0" err="1" smtClean="0"/>
+              <a:t>vụ</a:t>
+            </a:r>
+            <a:r>
+              <a:rPr lang="en-US" dirty="0" smtClean="0"/>
+              <a:t>, </a:t>
+            </a:r>
+            <a:r>
+              <a:rPr lang="en-US" dirty="0" err="1" smtClean="0"/>
+              <a:t>gây</a:t>
+            </a:r>
+            <a:r>
+              <a:rPr lang="en-US" dirty="0" smtClean="0"/>
+              <a:t> </a:t>
+            </a:r>
+            <a:r>
+              <a:rPr lang="en-US" dirty="0" err="1" smtClean="0"/>
+              <a:t>cảm</a:t>
+            </a:r>
+            <a:r>
+              <a:rPr lang="en-US" dirty="0" smtClean="0"/>
+              <a:t> </a:t>
+            </a:r>
+            <a:r>
+              <a:rPr lang="en-US" dirty="0" err="1" smtClean="0"/>
+              <a:t>giác</a:t>
             </a:r>
             <a:r>
               <a:rPr lang="en-US" dirty="0" smtClean="0"/>
@@ -7361,7 +7263,7 @@
               <a:t>hệ</a:t>
             </a:r>
             <a:r>
-              <a:rPr lang="en-US" dirty="0" smtClean="0"/>
+              <a:rPr lang="en-US" dirty="0"/>
               <a:t> </a:t>
             </a:r>
             <a:r>
@@ -7370,63 +7272,114 @@
             </a:r>
             <a:r>
               <a:rPr lang="en-US" dirty="0" smtClean="0"/>
-              <a:t>. </a:t>
-            </a:r>
-            <a:r>
-              <a:rPr lang="en-US" dirty="0" err="1" smtClean="0"/>
-              <a:t>Chúng</a:t>
-            </a:r>
-            <a:r>
-              <a:rPr lang="en-US" dirty="0" smtClean="0"/>
-              <a:t> </a:t>
-            </a:r>
-            <a:r>
-              <a:rPr lang="en-US" dirty="0" err="1" smtClean="0"/>
-              <a:t>bắt</a:t>
-            </a:r>
-            <a:r>
-              <a:rPr lang="en-US" dirty="0" smtClean="0"/>
-              <a:t> </a:t>
-            </a:r>
-            <a:r>
-              <a:rPr lang="en-US" dirty="0" err="1" smtClean="0"/>
-              <a:t>đầu</a:t>
-            </a:r>
-            <a:r>
-              <a:rPr lang="en-US" dirty="0" smtClean="0"/>
-              <a:t> sử dụng và </a:t>
-            </a:r>
-            <a:r>
-              <a:rPr lang="en-US" dirty="0" err="1" smtClean="0"/>
-              <a:t>tiêu</a:t>
-            </a:r>
-            <a:r>
-              <a:rPr lang="en-US" dirty="0" smtClean="0"/>
-              <a:t> </a:t>
-            </a:r>
-            <a:r>
-              <a:rPr lang="en-US" dirty="0" err="1" smtClean="0"/>
-              <a:t>thụ</a:t>
-            </a:r>
-            <a:r>
-              <a:rPr lang="en-US" dirty="0" smtClean="0"/>
-              <a:t> </a:t>
-            </a:r>
-            <a:r>
-              <a:rPr lang="en-US" dirty="0" err="1" smtClean="0"/>
-              <a:t>tài</a:t>
-            </a:r>
-            <a:r>
-              <a:rPr lang="en-US" dirty="0" smtClean="0"/>
-              <a:t> </a:t>
-            </a:r>
-            <a:r>
-              <a:rPr lang="en-US" dirty="0" err="1" smtClean="0"/>
-              <a:t>nguyên</a:t>
-            </a:r>
-            <a:r>
-              <a:rPr lang="en-US" dirty="0" smtClean="0"/>
-              <a:t> của </a:t>
+              <a:t> có thể </a:t>
+            </a:r>
+            <a:r>
+              <a:rPr lang="en-US" dirty="0" err="1" smtClean="0"/>
+              <a:t>chạy</a:t>
+            </a:r>
+            <a:r>
+              <a:rPr lang="en-US" dirty="0" smtClean="0"/>
+              <a:t> song </a:t>
+            </a:r>
+            <a:r>
+              <a:rPr lang="en-US" dirty="0" err="1" smtClean="0"/>
+              <a:t>song</a:t>
+            </a:r>
+            <a:r>
+              <a:rPr lang="en-US" dirty="0" smtClean="0"/>
+              <a:t> </a:t>
+            </a:r>
+            <a:r>
+              <a:rPr lang="en-US" dirty="0" err="1" smtClean="0"/>
+              <a:t>rất</a:t>
+            </a:r>
+            <a:r>
+              <a:rPr lang="en-US" dirty="0" smtClean="0"/>
+              <a:t> </a:t>
+            </a:r>
+            <a:r>
+              <a:rPr lang="en-US" dirty="0" err="1" smtClean="0"/>
+              <a:t>nhiều</a:t>
+            </a:r>
+            <a:r>
+              <a:rPr lang="en-US" dirty="0" smtClean="0"/>
+              <a:t> </a:t>
+            </a:r>
+            <a:r>
+              <a:rPr lang="en-US" dirty="0" err="1" smtClean="0"/>
+              <a:t>tiến</a:t>
+            </a:r>
+            <a:r>
+              <a:rPr lang="en-US" dirty="0" smtClean="0"/>
+              <a:t> trình.</a:t>
+            </a:r>
+          </a:p>
+          <a:p>
+            <a:pPr lvl="0"/>
+            <a:r>
+              <a:rPr lang="en-US" dirty="0" err="1" smtClean="0"/>
+              <a:t>Câu</a:t>
+            </a:r>
+            <a:r>
+              <a:rPr lang="en-US" dirty="0" smtClean="0"/>
+              <a:t> hỏi </a:t>
+            </a:r>
+            <a:r>
+              <a:rPr lang="en-US" dirty="0" err="1" smtClean="0"/>
+              <a:t>pv</a:t>
+            </a:r>
+            <a:r>
+              <a:rPr lang="en-US" dirty="0" smtClean="0"/>
+              <a:t>: </a:t>
+            </a:r>
+            <a:r>
+              <a:rPr lang="en-US" dirty="0" err="1" smtClean="0"/>
+              <a:t>Hệ</a:t>
+            </a:r>
+            <a:r>
+              <a:rPr lang="en-US" dirty="0" smtClean="0"/>
+              <a:t> </a:t>
+            </a:r>
+            <a:r>
+              <a:rPr lang="en-US" dirty="0" err="1" smtClean="0"/>
+              <a:t>điều</a:t>
+            </a:r>
+            <a:r>
+              <a:rPr lang="en-US" dirty="0" smtClean="0"/>
+              <a:t> </a:t>
+            </a:r>
+            <a:r>
+              <a:rPr lang="en-US" dirty="0" err="1" smtClean="0"/>
+              <a:t>hành</a:t>
+            </a:r>
+            <a:r>
+              <a:rPr lang="en-US" dirty="0" smtClean="0"/>
+              <a:t> </a:t>
+            </a:r>
+            <a:r>
+              <a:rPr lang="en-US" dirty="0" err="1" smtClean="0"/>
+              <a:t>đa</a:t>
+            </a:r>
+            <a:r>
+              <a:rPr lang="en-US" dirty="0" smtClean="0"/>
+              <a:t> </a:t>
+            </a:r>
+            <a:r>
+              <a:rPr lang="en-US" dirty="0" err="1" smtClean="0"/>
+              <a:t>nhiệm</a:t>
+            </a:r>
+            <a:r>
+              <a:rPr lang="en-US" dirty="0" smtClean="0"/>
+              <a:t> có thể </a:t>
+            </a:r>
+            <a:r>
+              <a:rPr lang="en-US" dirty="0" err="1" smtClean="0"/>
+              <a:t>chạy</a:t>
+            </a:r>
+            <a:r>
+              <a:rPr lang="en-US" dirty="0" smtClean="0"/>
+              <a:t> trên </a:t>
             </a:r>
             <a:r>
               <a:rPr lang="en-US" dirty="0" err="1" smtClean="0"/>
@@ -7442,66 +7395,7 @@
             </a:r>
             <a:r>
               <a:rPr lang="en-US" dirty="0" smtClean="0"/>
-              <a:t>.</a:t>
-            </a:r>
-          </a:p>
-          <a:p>
-            <a:pPr lvl="0"/>
-            <a:r>
-              <a:rPr lang="en-US" dirty="0" err="1" smtClean="0"/>
-              <a:t>Câu</a:t>
-            </a:r>
-            <a:r>
-              <a:rPr lang="en-US" dirty="0" smtClean="0"/>
-              <a:t> hỏi </a:t>
-            </a:r>
-            <a:r>
-              <a:rPr lang="en-US" dirty="0" err="1" smtClean="0"/>
-              <a:t>pv</a:t>
-            </a:r>
-            <a:r>
-              <a:rPr lang="en-US" dirty="0" smtClean="0"/>
-              <a:t>: </a:t>
-            </a:r>
-            <a:r>
-              <a:rPr lang="en-US" dirty="0" err="1" smtClean="0"/>
-              <a:t>Chương</a:t>
-            </a:r>
-            <a:r>
-              <a:rPr lang="en-US" dirty="0" smtClean="0"/>
-              <a:t> trình và </a:t>
-            </a:r>
-            <a:r>
-              <a:rPr lang="en-US" dirty="0" err="1" smtClean="0"/>
-              <a:t>tiến</a:t>
-            </a:r>
-            <a:r>
-              <a:rPr lang="en-US" dirty="0" smtClean="0"/>
-              <a:t> trình </a:t>
-            </a:r>
-            <a:r>
-              <a:rPr lang="en-US" dirty="0" err="1" smtClean="0"/>
-              <a:t>khác</a:t>
-            </a:r>
-            <a:r>
-              <a:rPr lang="en-US" dirty="0" smtClean="0"/>
-              <a:t> </a:t>
-            </a:r>
-            <a:r>
-              <a:rPr lang="en-US" dirty="0" err="1" smtClean="0"/>
-              <a:t>nhau</a:t>
-            </a:r>
-            <a:r>
-              <a:rPr lang="en-US" dirty="0" smtClean="0"/>
-              <a:t> </a:t>
-            </a:r>
-            <a:r>
-              <a:rPr lang="en-US" dirty="0" err="1" smtClean="0"/>
-              <a:t>ntn</a:t>
-            </a:r>
-            <a:r>
-              <a:rPr lang="en-US" dirty="0" smtClean="0"/>
-              <a:t>?</a:t>
+              <a:t> single core không?</a:t>
             </a:r>
             <a:endParaRPr lang="en-US" dirty="0"/>
           </a:p>
@@ -7510,7 +7404,7 @@
     </p:spTree>
     <p:extLst>
       <p:ext uri="{BB962C8B-B14F-4D97-AF65-F5344CB8AC3E}">
-        <p14:creationId xmlns:p14="http://schemas.microsoft.com/office/powerpoint/2010/main" val="400591153"/>
+        <p14:creationId xmlns:p14="http://schemas.microsoft.com/office/powerpoint/2010/main" val="2345156530"/>
       </p:ext>
     </p:extLst>
   </p:cSld>

</xml_diff>